<commit_message>
Add more details about the challange to the powerpoint file
</commit_message>
<xml_diff>
--- a/media/powerpoint.pptx
+++ b/media/powerpoint.pptx
@@ -5,10 +5,10 @@
     <p:sldMasterId id="2147483648" r:id="rId1"/>
   </p:sldMasterIdLst>
   <p:notesMasterIdLst>
-    <p:notesMasterId r:id="rId16"/>
+    <p:notesMasterId r:id="rId14"/>
   </p:notesMasterIdLst>
   <p:handoutMasterIdLst>
-    <p:handoutMasterId r:id="rId17"/>
+    <p:handoutMasterId r:id="rId15"/>
   </p:handoutMasterIdLst>
   <p:sldIdLst>
     <p:sldId id="313" r:id="rId2"/>
@@ -21,24 +21,29 @@
     <p:sldId id="329" r:id="rId9"/>
     <p:sldId id="319" r:id="rId10"/>
     <p:sldId id="327" r:id="rId11"/>
-    <p:sldId id="320" r:id="rId12"/>
-    <p:sldId id="321" r:id="rId13"/>
-    <p:sldId id="322" r:id="rId14"/>
-    <p:sldId id="323" r:id="rId15"/>
+    <p:sldId id="330" r:id="rId12"/>
+    <p:sldId id="331" r:id="rId13"/>
   </p:sldIdLst>
   <p:sldSz cx="9145588" cy="6859588"/>
   <p:notesSz cx="6797675" cy="9926638"/>
   <p:embeddedFontLst>
     <p:embeddedFont>
+      <p:font typeface="Consolas" panose="020B0609020204030204" pitchFamily="49" charset="0"/>
+      <p:regular r:id="rId16"/>
+      <p:bold r:id="rId17"/>
+      <p:italic r:id="rId18"/>
+      <p:boldItalic r:id="rId19"/>
+    </p:embeddedFont>
+    <p:embeddedFont>
       <p:font typeface="Fira Sans" panose="020B0503050000020004" pitchFamily="34" charset="0"/>
-      <p:regular r:id="rId18"/>
-      <p:bold r:id="rId19"/>
-      <p:italic r:id="rId20"/>
-      <p:boldItalic r:id="rId21"/>
+      <p:regular r:id="rId20"/>
+      <p:bold r:id="rId21"/>
+      <p:italic r:id="rId22"/>
+      <p:boldItalic r:id="rId23"/>
     </p:embeddedFont>
   </p:embeddedFontLst>
   <p:custDataLst>
-    <p:tags r:id="rId22"/>
+    <p:tags r:id="rId24"/>
   </p:custDataLst>
   <p:defaultTextStyle>
     <a:defPPr>
@@ -267,7 +272,7 @@
                 <a:latin typeface="Fira Sans" pitchFamily="34" charset="0"/>
               </a:rPr>
               <a:pPr/>
-              <a:t>2018-04-11</a:t>
+              <a:t>2018-04-12</a:t>
             </a:fld>
             <a:endParaRPr lang="de-DE" dirty="0">
               <a:latin typeface="Fira Sans" pitchFamily="34" charset="0"/>
@@ -446,7 +451,7 @@
             <a:fld id="{508B489F-89BA-4A83-9D2B-E0B2D4476E33}" type="datetimeFigureOut">
               <a:rPr lang="de-DE" smtClean="0"/>
               <a:pPr/>
-              <a:t>2018-04-11</a:t>
+              <a:t>2018-04-12</a:t>
             </a:fld>
             <a:endParaRPr lang="de-DE" dirty="0"/>
           </a:p>
@@ -762,22 +767,6 @@
           <a:bodyPr/>
           <a:lstStyle/>
           <a:p>
-            <a:r>
-              <a:rPr lang="de-DE" dirty="0" smtClean="0"/>
-              <a:t>Nachfragen,</a:t>
-            </a:r>
-            <a:r>
-              <a:rPr lang="de-DE" baseline="0" dirty="0" smtClean="0"/>
-              <a:t> ob Vorkenntnisse mit </a:t>
-            </a:r>
-            <a:r>
-              <a:rPr lang="de-DE" baseline="0" dirty="0" err="1" smtClean="0"/>
-              <a:t>git</a:t>
-            </a:r>
-            <a:r>
-              <a:rPr lang="de-DE" baseline="0" dirty="0" smtClean="0"/>
-              <a:t> da sind.</a:t>
-            </a:r>
             <a:endParaRPr lang="de-DE" dirty="0"/>
           </a:p>
         </p:txBody>
@@ -810,6 +799,95 @@
     <p:extLst>
       <p:ext uri="{BB962C8B-B14F-4D97-AF65-F5344CB8AC3E}">
         <p14:creationId xmlns:p14="http://schemas.microsoft.com/office/powerpoint/2010/main" val="2156050619"/>
+      </p:ext>
+    </p:extLst>
+  </p:cSld>
+  <p:clrMapOvr>
+    <a:masterClrMapping/>
+  </p:clrMapOvr>
+</p:notes>
+</file>
+
+<file path=ppt/notesSlides/notesSlide2.xml><?xml version="1.0" encoding="utf-8"?>
+<p:notes xmlns:a="http://schemas.openxmlformats.org/drawingml/2006/main" xmlns:r="http://schemas.openxmlformats.org/officeDocument/2006/relationships" xmlns:p="http://schemas.openxmlformats.org/presentationml/2006/main">
+  <p:cSld>
+    <p:spTree>
+      <p:nvGrpSpPr>
+        <p:cNvPr id="1" name=""/>
+        <p:cNvGrpSpPr/>
+        <p:nvPr/>
+      </p:nvGrpSpPr>
+      <p:grpSpPr>
+        <a:xfrm>
+          <a:off x="0" y="0"/>
+          <a:ext cx="0" cy="0"/>
+          <a:chOff x="0" y="0"/>
+          <a:chExt cx="0" cy="0"/>
+        </a:xfrm>
+      </p:grpSpPr>
+      <p:sp>
+        <p:nvSpPr>
+          <p:cNvPr id="2" name="Folienbildplatzhalter 1"/>
+          <p:cNvSpPr>
+            <a:spLocks noGrp="1" noRot="1" noChangeAspect="1"/>
+          </p:cNvSpPr>
+          <p:nvPr>
+            <p:ph type="sldImg"/>
+          </p:nvPr>
+        </p:nvSpPr>
+        <p:spPr/>
+      </p:sp>
+      <p:sp>
+        <p:nvSpPr>
+          <p:cNvPr id="3" name="Notizenplatzhalter 2"/>
+          <p:cNvSpPr>
+            <a:spLocks noGrp="1"/>
+          </p:cNvSpPr>
+          <p:nvPr>
+            <p:ph type="body" idx="1"/>
+          </p:nvPr>
+        </p:nvSpPr>
+        <p:spPr/>
+        <p:txBody>
+          <a:bodyPr/>
+          <a:lstStyle/>
+          <a:p>
+            <a:r>
+              <a:rPr lang="de-DE" dirty="0" smtClean="0"/>
+              <a:t>Nun dürft ihr programmieren!</a:t>
+            </a:r>
+            <a:endParaRPr lang="de-DE" dirty="0"/>
+          </a:p>
+        </p:txBody>
+      </p:sp>
+      <p:sp>
+        <p:nvSpPr>
+          <p:cNvPr id="4" name="Foliennummernplatzhalter 3"/>
+          <p:cNvSpPr>
+            <a:spLocks noGrp="1"/>
+          </p:cNvSpPr>
+          <p:nvPr>
+            <p:ph type="sldNum" sz="quarter" idx="10"/>
+          </p:nvPr>
+        </p:nvSpPr>
+        <p:spPr/>
+        <p:txBody>
+          <a:bodyPr/>
+          <a:lstStyle/>
+          <a:p>
+            <a:fld id="{ADA4B6C8-3475-40AE-AEEA-0F9B44F429A0}" type="slidenum">
+              <a:rPr lang="de-DE" smtClean="0"/>
+              <a:pPr/>
+              <a:t>11</a:t>
+            </a:fld>
+            <a:endParaRPr lang="de-DE" dirty="0"/>
+          </a:p>
+        </p:txBody>
+      </p:sp>
+    </p:spTree>
+    <p:extLst>
+      <p:ext uri="{BB962C8B-B14F-4D97-AF65-F5344CB8AC3E}">
+        <p14:creationId xmlns:p14="http://schemas.microsoft.com/office/powerpoint/2010/main" val="3608346142"/>
       </p:ext>
     </p:extLst>
   </p:cSld>
@@ -1265,7 +1343,7 @@
                   <a:spcPts val="0"/>
                 </a:spcAft>
               </a:pPr>
-              <a:t>2018-04-11</a:t>
+              <a:t>2018-04-12</a:t>
             </a:fld>
             <a:endParaRPr lang="de-DE" sz="800" dirty="0">
               <a:solidFill>
@@ -2993,186 +3071,6 @@
       </p:sp>
       <p:sp>
         <p:nvSpPr>
-          <p:cNvPr id="8" name="Textfeld 7"/>
-          <p:cNvSpPr txBox="1"/>
-          <p:nvPr userDrawn="1"/>
-        </p:nvSpPr>
-        <p:spPr>
-          <a:xfrm>
-            <a:off x="1116003" y="2538551"/>
-            <a:ext cx="6264275" cy="276999"/>
-          </a:xfrm>
-          <a:prstGeom prst="rect">
-            <a:avLst/>
-          </a:prstGeom>
-          <a:noFill/>
-        </p:spPr>
-        <p:txBody>
-          <a:bodyPr lIns="0" tIns="0" rIns="0" bIns="0" anchor="ctr" anchorCtr="0">
-            <a:spAutoFit/>
-          </a:bodyPr>
-          <a:lstStyle/>
-          <a:p>
-            <a:pPr defTabSz="914272" fontAlgn="auto">
-              <a:spcBef>
-                <a:spcPts val="0"/>
-              </a:spcBef>
-              <a:spcAft>
-                <a:spcPts val="0"/>
-              </a:spcAft>
-              <a:defRPr/>
-            </a:pPr>
-            <a:r>
-              <a:rPr lang="de-DE" sz="1800" kern="1200" dirty="0">
-                <a:solidFill>
-                  <a:schemeClr val="tx1"/>
-                </a:solidFill>
-                <a:latin typeface="+mn-lt"/>
-                <a:ea typeface="+mn-ea"/>
-                <a:cs typeface="+mn-cs"/>
-              </a:rPr>
-              <a:t>Bitte geben Sie Ihren Text auf der Masterfolie ein</a:t>
-            </a:r>
-          </a:p>
-        </p:txBody>
-      </p:sp>
-      <p:sp>
-        <p:nvSpPr>
-          <p:cNvPr id="10" name="Textfeld 9"/>
-          <p:cNvSpPr txBox="1"/>
-          <p:nvPr userDrawn="1"/>
-        </p:nvSpPr>
-        <p:spPr>
-          <a:xfrm>
-            <a:off x="1116003" y="3025301"/>
-            <a:ext cx="6264275" cy="276999"/>
-          </a:xfrm>
-          <a:prstGeom prst="rect">
-            <a:avLst/>
-          </a:prstGeom>
-          <a:noFill/>
-        </p:spPr>
-        <p:txBody>
-          <a:bodyPr lIns="0" tIns="0" rIns="0" bIns="0" anchor="ctr" anchorCtr="0">
-            <a:spAutoFit/>
-          </a:bodyPr>
-          <a:lstStyle/>
-          <a:p>
-            <a:pPr defTabSz="914272" fontAlgn="auto">
-              <a:spcBef>
-                <a:spcPts val="0"/>
-              </a:spcBef>
-              <a:spcAft>
-                <a:spcPts val="0"/>
-              </a:spcAft>
-              <a:defRPr/>
-            </a:pPr>
-            <a:r>
-              <a:rPr lang="de-DE" sz="1800" kern="1200" dirty="0">
-                <a:solidFill>
-                  <a:schemeClr val="tx1"/>
-                </a:solidFill>
-                <a:latin typeface="+mn-lt"/>
-                <a:ea typeface="+mn-ea"/>
-                <a:cs typeface="+mn-cs"/>
-              </a:rPr>
-              <a:t>Bitte geben Sie Ihren Text auf der Masterfolie ein</a:t>
-            </a:r>
-          </a:p>
-        </p:txBody>
-      </p:sp>
-      <p:sp>
-        <p:nvSpPr>
-          <p:cNvPr id="11" name="Textfeld 10"/>
-          <p:cNvSpPr txBox="1"/>
-          <p:nvPr userDrawn="1"/>
-        </p:nvSpPr>
-        <p:spPr>
-          <a:xfrm>
-            <a:off x="1116003" y="3512051"/>
-            <a:ext cx="6264275" cy="276999"/>
-          </a:xfrm>
-          <a:prstGeom prst="rect">
-            <a:avLst/>
-          </a:prstGeom>
-          <a:noFill/>
-        </p:spPr>
-        <p:txBody>
-          <a:bodyPr lIns="0" tIns="0" rIns="0" bIns="0" anchor="ctr" anchorCtr="0">
-            <a:spAutoFit/>
-          </a:bodyPr>
-          <a:lstStyle/>
-          <a:p>
-            <a:pPr defTabSz="914272" fontAlgn="auto">
-              <a:spcBef>
-                <a:spcPts val="0"/>
-              </a:spcBef>
-              <a:spcAft>
-                <a:spcPts val="0"/>
-              </a:spcAft>
-              <a:defRPr/>
-            </a:pPr>
-            <a:r>
-              <a:rPr lang="de-DE" sz="1800" kern="1200" dirty="0">
-                <a:solidFill>
-                  <a:schemeClr val="tx1"/>
-                </a:solidFill>
-                <a:latin typeface="+mn-lt"/>
-                <a:ea typeface="+mn-ea"/>
-                <a:cs typeface="+mn-cs"/>
-              </a:rPr>
-              <a:t>Bitte geben Sie Ihren Text auf der Masterfolie ein</a:t>
-            </a:r>
-          </a:p>
-        </p:txBody>
-      </p:sp>
-      <p:sp>
-        <p:nvSpPr>
-          <p:cNvPr id="12" name="Textfeld 11"/>
-          <p:cNvSpPr txBox="1"/>
-          <p:nvPr userDrawn="1"/>
-        </p:nvSpPr>
-        <p:spPr>
-          <a:xfrm>
-            <a:off x="1116003" y="3998801"/>
-            <a:ext cx="6264275" cy="276999"/>
-          </a:xfrm>
-          <a:prstGeom prst="rect">
-            <a:avLst/>
-          </a:prstGeom>
-          <a:noFill/>
-        </p:spPr>
-        <p:txBody>
-          <a:bodyPr lIns="0" tIns="0" rIns="0" bIns="0" anchor="ctr" anchorCtr="0">
-            <a:spAutoFit/>
-          </a:bodyPr>
-          <a:lstStyle/>
-          <a:p>
-            <a:pPr defTabSz="914272" fontAlgn="auto">
-              <a:spcBef>
-                <a:spcPts val="0"/>
-              </a:spcBef>
-              <a:spcAft>
-                <a:spcPts val="0"/>
-              </a:spcAft>
-              <a:defRPr/>
-            </a:pPr>
-            <a:r>
-              <a:rPr lang="de-DE" sz="1800" kern="1200" dirty="0">
-                <a:solidFill>
-                  <a:schemeClr val="tx1"/>
-                </a:solidFill>
-                <a:latin typeface="+mn-lt"/>
-                <a:ea typeface="+mn-ea"/>
-                <a:cs typeface="+mn-cs"/>
-              </a:rPr>
-              <a:t>Bitte geben Sie Ihren Text auf der Masterfolie ein</a:t>
-            </a:r>
-          </a:p>
-        </p:txBody>
-      </p:sp>
-      <p:sp>
-        <p:nvSpPr>
           <p:cNvPr id="13" name="Rechteck 12"/>
           <p:cNvSpPr>
             <a:spLocks noChangeArrowheads="1"/>
@@ -3305,190 +3203,6 @@
                 <a:latin typeface="+mj-lt"/>
               </a:rPr>
               <a:t>3</a:t>
-            </a:r>
-          </a:p>
-        </p:txBody>
-      </p:sp>
-      <p:sp>
-        <p:nvSpPr>
-          <p:cNvPr id="16" name="Rechteck 15"/>
-          <p:cNvSpPr>
-            <a:spLocks noChangeArrowheads="1"/>
-          </p:cNvSpPr>
-          <p:nvPr userDrawn="1"/>
-        </p:nvSpPr>
-        <p:spPr bwMode="auto">
-          <a:xfrm>
-            <a:off x="365857" y="2533050"/>
-            <a:ext cx="576000" cy="288000"/>
-          </a:xfrm>
-          <a:prstGeom prst="rect">
-            <a:avLst/>
-          </a:prstGeom>
-          <a:solidFill>
-            <a:schemeClr val="accent4"/>
-          </a:solidFill>
-          <a:ln w="0" algn="ctr">
-            <a:noFill/>
-            <a:round/>
-            <a:headEnd/>
-            <a:tailEnd/>
-          </a:ln>
-          <a:effectLst/>
-        </p:spPr>
-        <p:txBody>
-          <a:bodyPr wrap="none" lIns="72000" tIns="0" rIns="0" bIns="0" anchor="ctr" anchorCtr="0"/>
-          <a:lstStyle/>
-          <a:p>
-            <a:pPr algn="l" defTabSz="995072">
-              <a:defRPr/>
-            </a:pPr>
-            <a:r>
-              <a:rPr lang="de-DE" sz="1400" dirty="0">
-                <a:solidFill>
-                  <a:schemeClr val="bg1"/>
-                </a:solidFill>
-                <a:latin typeface="+mj-lt"/>
-              </a:rPr>
-              <a:t>4</a:t>
-            </a:r>
-          </a:p>
-        </p:txBody>
-      </p:sp>
-      <p:sp>
-        <p:nvSpPr>
-          <p:cNvPr id="17" name="Rechteck 16"/>
-          <p:cNvSpPr>
-            <a:spLocks noChangeArrowheads="1"/>
-          </p:cNvSpPr>
-          <p:nvPr userDrawn="1"/>
-        </p:nvSpPr>
-        <p:spPr bwMode="auto">
-          <a:xfrm>
-            <a:off x="365857" y="3019800"/>
-            <a:ext cx="576000" cy="288000"/>
-          </a:xfrm>
-          <a:prstGeom prst="rect">
-            <a:avLst/>
-          </a:prstGeom>
-          <a:solidFill>
-            <a:schemeClr val="accent4"/>
-          </a:solidFill>
-          <a:ln w="0" algn="ctr">
-            <a:noFill/>
-            <a:round/>
-            <a:headEnd/>
-            <a:tailEnd/>
-          </a:ln>
-          <a:effectLst/>
-        </p:spPr>
-        <p:txBody>
-          <a:bodyPr wrap="none" lIns="72000" tIns="0" rIns="0" bIns="0" anchor="ctr" anchorCtr="0"/>
-          <a:lstStyle/>
-          <a:p>
-            <a:pPr algn="l" defTabSz="995072">
-              <a:defRPr/>
-            </a:pPr>
-            <a:r>
-              <a:rPr lang="de-DE" sz="1400" dirty="0">
-                <a:solidFill>
-                  <a:schemeClr val="bg1"/>
-                </a:solidFill>
-                <a:latin typeface="+mj-lt"/>
-              </a:rPr>
-              <a:t>5</a:t>
-            </a:r>
-          </a:p>
-        </p:txBody>
-      </p:sp>
-      <p:sp>
-        <p:nvSpPr>
-          <p:cNvPr id="18" name="Rechteck 17"/>
-          <p:cNvSpPr>
-            <a:spLocks noChangeArrowheads="1"/>
-          </p:cNvSpPr>
-          <p:nvPr userDrawn="1"/>
-        </p:nvSpPr>
-        <p:spPr bwMode="auto">
-          <a:xfrm>
-            <a:off x="365857" y="3506550"/>
-            <a:ext cx="576000" cy="288000"/>
-          </a:xfrm>
-          <a:prstGeom prst="rect">
-            <a:avLst/>
-          </a:prstGeom>
-          <a:solidFill>
-            <a:schemeClr val="accent4"/>
-          </a:solidFill>
-          <a:ln w="0" algn="ctr">
-            <a:noFill/>
-            <a:round/>
-            <a:headEnd/>
-            <a:tailEnd/>
-          </a:ln>
-          <a:effectLst/>
-        </p:spPr>
-        <p:txBody>
-          <a:bodyPr wrap="none" lIns="72000" tIns="0" rIns="0" bIns="0" anchor="ctr" anchorCtr="0"/>
-          <a:lstStyle/>
-          <a:p>
-            <a:pPr algn="l" defTabSz="995072">
-              <a:defRPr/>
-            </a:pPr>
-            <a:r>
-              <a:rPr lang="de-DE" sz="1400" dirty="0">
-                <a:solidFill>
-                  <a:schemeClr val="bg1"/>
-                </a:solidFill>
-                <a:latin typeface="+mj-lt"/>
-              </a:rPr>
-              <a:t>6</a:t>
-            </a:r>
-          </a:p>
-        </p:txBody>
-      </p:sp>
-      <p:sp>
-        <p:nvSpPr>
-          <p:cNvPr id="19" name="Rechteck 18"/>
-          <p:cNvSpPr>
-            <a:spLocks noChangeArrowheads="1"/>
-          </p:cNvSpPr>
-          <p:nvPr userDrawn="1"/>
-        </p:nvSpPr>
-        <p:spPr bwMode="auto">
-          <a:xfrm>
-            <a:off x="365857" y="3993300"/>
-            <a:ext cx="576000" cy="288000"/>
-          </a:xfrm>
-          <a:prstGeom prst="rect">
-            <a:avLst/>
-          </a:prstGeom>
-          <a:solidFill>
-            <a:schemeClr val="accent4"/>
-          </a:solidFill>
-          <a:ln w="0" algn="ctr">
-            <a:noFill/>
-            <a:round/>
-            <a:headEnd/>
-            <a:tailEnd/>
-          </a:ln>
-          <a:effectLst/>
-        </p:spPr>
-        <p:txBody>
-          <a:bodyPr wrap="none" lIns="72000" tIns="0" rIns="0" bIns="0" anchor="ctr" anchorCtr="0"/>
-          <a:lstStyle/>
-          <a:p>
-            <a:pPr algn="l" defTabSz="995072">
-              <a:defRPr/>
-            </a:pPr>
-            <a:r>
-              <a:rPr lang="de-DE" sz="1400" dirty="0">
-                <a:solidFill>
-                  <a:schemeClr val="bg1"/>
-                </a:solidFill>
-                <a:latin typeface="+mj-lt"/>
-              </a:rPr>
-              <a:t>7</a:t>
             </a:r>
           </a:p>
         </p:txBody>
@@ -7924,7 +7638,7 @@
                   <a:spcPts val="0"/>
                 </a:spcAft>
               </a:pPr>
-              <a:t>2018-04-11</a:t>
+              <a:t>2018-04-12</a:t>
             </a:fld>
             <a:endParaRPr lang="de-DE" sz="800" dirty="0">
               <a:solidFill>
@@ -7956,6 +7670,13 @@
       </p:transition>
     </mc:Fallback>
   </mc:AlternateContent>
+  <p:timing>
+    <p:tnLst>
+      <p:par>
+        <p:cTn id="1" dur="indefinite" restart="never" nodeType="tmRoot"/>
+      </p:par>
+    </p:tnLst>
+  </p:timing>
 </p:sldLayout>
 </file>
 
@@ -8528,6 +8249,13 @@
       </p:transition>
     </mc:Fallback>
   </mc:AlternateContent>
+  <p:timing>
+    <p:tnLst>
+      <p:par>
+        <p:cTn id="1" dur="indefinite" restart="never" nodeType="tmRoot"/>
+      </p:par>
+    </p:tnLst>
+  </p:timing>
 </p:sldLayout>
 </file>
 
@@ -8973,6 +8701,13 @@
       </p:transition>
     </mc:Fallback>
   </mc:AlternateContent>
+  <p:timing>
+    <p:tnLst>
+      <p:par>
+        <p:cTn id="1" dur="indefinite" restart="never" nodeType="tmRoot"/>
+      </p:par>
+    </p:tnLst>
+  </p:timing>
 </p:sldLayout>
 </file>
 
@@ -13678,7 +13413,7 @@
                   <a:srgbClr val="707070"/>
                 </a:solidFill>
               </a:rPr>
-              <a:t>2018-04-11</a:t>
+              <a:t>2018-04-12</a:t>
             </a:fld>
             <a:r>
               <a:rPr lang="de-DE" sz="800" dirty="0">
@@ -14150,7 +13885,11 @@
           <a:p>
             <a:r>
               <a:rPr lang="de-DE" dirty="0" smtClean="0"/>
-              <a:t>ACTICO Code Challenge #TODO: Nummer hier</a:t>
+              <a:t>ACTICO Code </a:t>
+            </a:r>
+            <a:r>
+              <a:rPr lang="de-DE" dirty="0" smtClean="0"/>
+              <a:t>Challenge</a:t>
             </a:r>
             <a:endParaRPr lang="de-DE" dirty="0"/>
           </a:p>
@@ -14472,7 +14211,7 @@
           <a:p>
             <a:r>
               <a:rPr lang="de-DE" dirty="0" smtClean="0"/>
-              <a:t>Durchführung</a:t>
+              <a:t>Durchführung I</a:t>
             </a:r>
             <a:endParaRPr lang="de-DE" dirty="0"/>
           </a:p>
@@ -14491,7 +14230,7 @@
         <p:spPr>
           <a:xfrm>
             <a:off x="365823" y="1044000"/>
-            <a:ext cx="8488766" cy="246221"/>
+            <a:ext cx="8488766" cy="5006499"/>
           </a:xfrm>
         </p:spPr>
         <p:txBody>
@@ -14500,32 +14239,153 @@
           <a:p>
             <a:r>
               <a:rPr lang="de-DE" dirty="0" smtClean="0"/>
-              <a:t>TODO: </a:t>
+              <a:t>Teambildung:</a:t>
+            </a:r>
+          </a:p>
+          <a:p>
+            <a:pPr lvl="1"/>
+            <a:r>
+              <a:rPr lang="de-DE" dirty="0" smtClean="0"/>
+              <a:t>Je 1 erfahrener Programmierer und 2 Einsteiger</a:t>
+            </a:r>
+          </a:p>
+          <a:p>
+            <a:pPr lvl="1"/>
+            <a:r>
+              <a:rPr lang="de-DE" dirty="0" smtClean="0"/>
+              <a:t>Denkt euch einen Namen für euren Wolf aus</a:t>
+            </a:r>
+          </a:p>
+          <a:p>
+            <a:pPr lvl="1"/>
+            <a:endParaRPr lang="de-DE" dirty="0" smtClean="0"/>
+          </a:p>
+          <a:p>
+            <a:r>
+              <a:rPr lang="de-DE" dirty="0" smtClean="0"/>
+              <a:t>Öffnet die Kommandozeile im Verzeichnis des Projekts</a:t>
+            </a:r>
+          </a:p>
+          <a:p>
+            <a:pPr lvl="1"/>
+            <a:r>
+              <a:rPr lang="de-DE" b="1" dirty="0" err="1" smtClean="0">
+                <a:latin typeface="Consolas" panose="020B0609020204030204" pitchFamily="49" charset="0"/>
+              </a:rPr>
+              <a:t>git</a:t>
+            </a:r>
+            <a:r>
+              <a:rPr lang="de-DE" b="1" dirty="0" smtClean="0">
+                <a:latin typeface="Consolas" panose="020B0609020204030204" pitchFamily="49" charset="0"/>
+              </a:rPr>
+              <a:t> </a:t>
+            </a:r>
+            <a:r>
+              <a:rPr lang="de-DE" b="1" dirty="0" err="1" smtClean="0">
+                <a:latin typeface="Consolas" panose="020B0609020204030204" pitchFamily="49" charset="0"/>
+              </a:rPr>
+              <a:t>branch</a:t>
+            </a:r>
+            <a:r>
+              <a:rPr lang="de-DE" b="1" dirty="0" smtClean="0">
+                <a:latin typeface="Consolas" panose="020B0609020204030204" pitchFamily="49" charset="0"/>
+              </a:rPr>
+              <a:t> [Euer Wolf Name]</a:t>
+            </a:r>
+          </a:p>
+          <a:p>
+            <a:pPr lvl="1"/>
+            <a:endParaRPr lang="de-DE" dirty="0" smtClean="0"/>
+          </a:p>
+          <a:p>
+            <a:r>
+              <a:rPr lang="de-DE" dirty="0" smtClean="0"/>
+              <a:t>Öffnet das Projekt in </a:t>
             </a:r>
             <a:r>
               <a:rPr lang="de-DE" dirty="0" err="1" smtClean="0"/>
-              <a:t>Git</a:t>
-            </a:r>
+              <a:t>IntelliJ</a:t>
+            </a:r>
+            <a:endParaRPr lang="de-DE" dirty="0" smtClean="0"/>
+          </a:p>
+          <a:p>
+            <a:endParaRPr lang="de-DE" dirty="0"/>
+          </a:p>
+          <a:p>
             <a:r>
               <a:rPr lang="de-DE" dirty="0" smtClean="0"/>
-              <a:t> </a:t>
+              <a:t>Erzeugt euch eine Kopie von ./</a:t>
             </a:r>
             <a:r>
               <a:rPr lang="de-DE" dirty="0" err="1" smtClean="0"/>
-              <a:t>clone</a:t>
+              <a:t>java</a:t>
             </a:r>
             <a:r>
               <a:rPr lang="de-DE" dirty="0" smtClean="0"/>
-              <a:t>, </a:t>
+              <a:t>/</a:t>
             </a:r>
             <a:r>
               <a:rPr lang="de-DE" dirty="0" err="1" smtClean="0"/>
-              <a:t>Branch</a:t>
+              <a:t>src</a:t>
             </a:r>
             <a:r>
               <a:rPr lang="de-DE" dirty="0" smtClean="0"/>
-              <a:t>, Kopieren eines Animals, Bearbeiten</a:t>
-            </a:r>
+              <a:t>/</a:t>
+            </a:r>
+            <a:r>
+              <a:rPr lang="de-DE" dirty="0" err="1" smtClean="0"/>
+              <a:t>animals</a:t>
+            </a:r>
+            <a:r>
+              <a:rPr lang="de-DE" dirty="0" smtClean="0"/>
+              <a:t>/DefaultWolf.java</a:t>
+            </a:r>
+          </a:p>
+          <a:p>
+            <a:pPr lvl="1"/>
+            <a:r>
+              <a:rPr lang="de-DE" dirty="0" smtClean="0"/>
+              <a:t>Diese Kopie dürft ihr bearbeiten!</a:t>
+            </a:r>
+          </a:p>
+          <a:p>
+            <a:endParaRPr lang="de-DE" dirty="0"/>
+          </a:p>
+          <a:p>
+            <a:r>
+              <a:rPr lang="de-DE" dirty="0" smtClean="0"/>
+              <a:t>In der Datei /.</a:t>
+            </a:r>
+            <a:r>
+              <a:rPr lang="de-DE" dirty="0" err="1" smtClean="0"/>
+              <a:t>java</a:t>
+            </a:r>
+            <a:r>
+              <a:rPr lang="de-DE" dirty="0" smtClean="0"/>
+              <a:t>/</a:t>
+            </a:r>
+            <a:r>
+              <a:rPr lang="de-DE" dirty="0" err="1" smtClean="0"/>
+              <a:t>src</a:t>
+            </a:r>
+            <a:r>
+              <a:rPr lang="de-DE" dirty="0" smtClean="0"/>
+              <a:t>/wild/Wild.java, fügt euren Wolf hinzu</a:t>
+            </a:r>
+          </a:p>
+          <a:p>
+            <a:endParaRPr lang="de-DE" dirty="0"/>
+          </a:p>
+          <a:p>
+            <a:r>
+              <a:rPr lang="de-DE" dirty="0" smtClean="0"/>
+              <a:t>Testet das Programm, durch Klick auf den grünen Pfeil</a:t>
+            </a:r>
+          </a:p>
+          <a:p>
+            <a:endParaRPr lang="de-DE" dirty="0"/>
+          </a:p>
+          <a:p>
             <a:endParaRPr lang="de-DE" dirty="0"/>
           </a:p>
         </p:txBody>
@@ -14582,8 +14442,697 @@
 </file>
 
 <file path=ppt/slides/slide11.xml><?xml version="1.0" encoding="utf-8"?>
+<p:sld xmlns:a="http://schemas.openxmlformats.org/drawingml/2006/main" xmlns:r="http://schemas.openxmlformats.org/officeDocument/2006/relationships" xmlns:p="http://schemas.openxmlformats.org/presentationml/2006/main">
+  <p:cSld>
+    <p:spTree>
+      <p:nvGrpSpPr>
+        <p:cNvPr id="1" name=""/>
+        <p:cNvGrpSpPr/>
+        <p:nvPr/>
+      </p:nvGrpSpPr>
+      <p:grpSpPr>
+        <a:xfrm>
+          <a:off x="0" y="0"/>
+          <a:ext cx="0" cy="0"/>
+          <a:chOff x="0" y="0"/>
+          <a:chExt cx="0" cy="0"/>
+        </a:xfrm>
+      </p:grpSpPr>
+      <p:sp>
+        <p:nvSpPr>
+          <p:cNvPr id="2" name="Titel 1"/>
+          <p:cNvSpPr>
+            <a:spLocks noGrp="1"/>
+          </p:cNvSpPr>
+          <p:nvPr>
+            <p:ph type="title"/>
+          </p:nvPr>
+        </p:nvSpPr>
+        <p:spPr/>
+        <p:txBody>
+          <a:bodyPr/>
+          <a:lstStyle/>
+          <a:p>
+            <a:r>
+              <a:rPr lang="de-DE" dirty="0" smtClean="0"/>
+              <a:t>Durchführung II</a:t>
+            </a:r>
+            <a:endParaRPr lang="de-DE" dirty="0"/>
+          </a:p>
+        </p:txBody>
+      </p:sp>
+      <p:sp>
+        <p:nvSpPr>
+          <p:cNvPr id="3" name="Textplatzhalter 2"/>
+          <p:cNvSpPr>
+            <a:spLocks noGrp="1"/>
+          </p:cNvSpPr>
+          <p:nvPr>
+            <p:ph type="body" sz="quarter" idx="10"/>
+          </p:nvPr>
+        </p:nvSpPr>
+        <p:spPr/>
+        <p:txBody>
+          <a:bodyPr/>
+          <a:lstStyle/>
+          <a:p>
+            <a:endParaRPr lang="de-DE"/>
+          </a:p>
+        </p:txBody>
+      </p:sp>
+      <p:sp>
+        <p:nvSpPr>
+          <p:cNvPr id="4" name="Textplatzhalter 3"/>
+          <p:cNvSpPr>
+            <a:spLocks noGrp="1"/>
+          </p:cNvSpPr>
+          <p:nvPr>
+            <p:ph type="body" sz="quarter" idx="11"/>
+          </p:nvPr>
+        </p:nvSpPr>
+        <p:spPr/>
+        <p:txBody>
+          <a:bodyPr/>
+          <a:lstStyle/>
+          <a:p>
+            <a:endParaRPr lang="de-DE"/>
+          </a:p>
+        </p:txBody>
+      </p:sp>
+      <p:pic>
+        <p:nvPicPr>
+          <p:cNvPr id="5" name="Grafik 4"/>
+          <p:cNvPicPr>
+            <a:picLocks noChangeAspect="1"/>
+          </p:cNvPicPr>
+          <p:nvPr/>
+        </p:nvPicPr>
+        <p:blipFill>
+          <a:blip r:embed="rId3"/>
+          <a:stretch>
+            <a:fillRect/>
+          </a:stretch>
+        </p:blipFill>
+        <p:spPr>
+          <a:xfrm>
+            <a:off x="365823" y="1044000"/>
+            <a:ext cx="8488766" cy="4739881"/>
+          </a:xfrm>
+          <a:prstGeom prst="rect">
+            <a:avLst/>
+          </a:prstGeom>
+        </p:spPr>
+      </p:pic>
+      <p:sp>
+        <p:nvSpPr>
+          <p:cNvPr id="6" name="Abgerundetes Rechteck 5"/>
+          <p:cNvSpPr/>
+          <p:nvPr/>
+        </p:nvSpPr>
+        <p:spPr>
+          <a:xfrm>
+            <a:off x="3387633" y="1026705"/>
+            <a:ext cx="1375954" cy="671745"/>
+          </a:xfrm>
+          <a:prstGeom prst="roundRect">
+            <a:avLst/>
+          </a:prstGeom>
+          <a:solidFill>
+            <a:schemeClr val="accent5">
+              <a:lumMod val="85000"/>
+            </a:schemeClr>
+          </a:solidFill>
+          <a:ln>
+            <a:noFill/>
+          </a:ln>
+        </p:spPr>
+        <p:style>
+          <a:lnRef idx="2">
+            <a:schemeClr val="accent1">
+              <a:shade val="50000"/>
+            </a:schemeClr>
+          </a:lnRef>
+          <a:fillRef idx="1">
+            <a:schemeClr val="accent1"/>
+          </a:fillRef>
+          <a:effectRef idx="0">
+            <a:schemeClr val="accent1"/>
+          </a:effectRef>
+          <a:fontRef idx="minor">
+            <a:schemeClr val="lt1"/>
+          </a:fontRef>
+        </p:style>
+        <p:txBody>
+          <a:bodyPr lIns="0" tIns="0" rIns="0" bIns="0" rtlCol="0" anchor="ctr"/>
+          <a:lstStyle/>
+          <a:p>
+            <a:pPr algn="ctr"/>
+            <a:r>
+              <a:rPr lang="de-DE" sz="1400" dirty="0" smtClean="0">
+                <a:solidFill>
+                  <a:schemeClr val="tx1"/>
+                </a:solidFill>
+              </a:rPr>
+              <a:t>Hier zum testen eures Wolfs klicken</a:t>
+            </a:r>
+            <a:endParaRPr lang="de-DE" sz="1400" dirty="0" smtClean="0">
+              <a:solidFill>
+                <a:schemeClr val="tx1"/>
+              </a:solidFill>
+            </a:endParaRPr>
+          </a:p>
+        </p:txBody>
+      </p:sp>
+      <p:cxnSp>
+        <p:nvCxnSpPr>
+          <p:cNvPr id="8" name="Gerade Verbindung mit Pfeil 7"/>
+          <p:cNvCxnSpPr/>
+          <p:nvPr/>
+        </p:nvCxnSpPr>
+        <p:spPr>
+          <a:xfrm>
+            <a:off x="4763587" y="1375954"/>
+            <a:ext cx="1802676" cy="99897"/>
+          </a:xfrm>
+          <a:prstGeom prst="straightConnector1">
+            <a:avLst/>
+          </a:prstGeom>
+          <a:ln>
+            <a:tailEnd type="triangle"/>
+          </a:ln>
+        </p:spPr>
+        <p:style>
+          <a:lnRef idx="3">
+            <a:schemeClr val="accent4"/>
+          </a:lnRef>
+          <a:fillRef idx="0">
+            <a:schemeClr val="accent4"/>
+          </a:fillRef>
+          <a:effectRef idx="2">
+            <a:schemeClr val="accent4"/>
+          </a:effectRef>
+          <a:fontRef idx="minor">
+            <a:schemeClr val="tx1"/>
+          </a:fontRef>
+        </p:style>
+      </p:cxnSp>
+      <p:sp>
+        <p:nvSpPr>
+          <p:cNvPr id="10" name="Abgerundetes Rechteck 9"/>
+          <p:cNvSpPr/>
+          <p:nvPr/>
+        </p:nvSpPr>
+        <p:spPr>
+          <a:xfrm>
+            <a:off x="4990011" y="2017398"/>
+            <a:ext cx="2394857" cy="1196066"/>
+          </a:xfrm>
+          <a:prstGeom prst="roundRect">
+            <a:avLst/>
+          </a:prstGeom>
+          <a:solidFill>
+            <a:schemeClr val="accent5">
+              <a:lumMod val="85000"/>
+            </a:schemeClr>
+          </a:solidFill>
+          <a:ln>
+            <a:noFill/>
+          </a:ln>
+        </p:spPr>
+        <p:style>
+          <a:lnRef idx="2">
+            <a:schemeClr val="accent1">
+              <a:shade val="50000"/>
+            </a:schemeClr>
+          </a:lnRef>
+          <a:fillRef idx="1">
+            <a:schemeClr val="accent1"/>
+          </a:fillRef>
+          <a:effectRef idx="0">
+            <a:schemeClr val="accent1"/>
+          </a:effectRef>
+          <a:fontRef idx="minor">
+            <a:schemeClr val="lt1"/>
+          </a:fontRef>
+        </p:style>
+        <p:txBody>
+          <a:bodyPr lIns="0" tIns="0" rIns="0" bIns="0" rtlCol="0" anchor="ctr"/>
+          <a:lstStyle/>
+          <a:p>
+            <a:pPr algn="ctr"/>
+            <a:r>
+              <a:rPr lang="de-DE" sz="1400" dirty="0" smtClean="0">
+                <a:solidFill>
+                  <a:schemeClr val="tx1"/>
+                </a:solidFill>
+              </a:rPr>
+              <a:t>Wird aufgerufen, wenn ihr kämpft. Parameter „c“ ist der Typ eures Gegners. Ihr müsst ein </a:t>
+            </a:r>
+            <a:r>
+              <a:rPr lang="de-DE" sz="1400" dirty="0" err="1" smtClean="0">
+                <a:solidFill>
+                  <a:schemeClr val="tx1"/>
+                </a:solidFill>
+              </a:rPr>
+              <a:t>Attack-Enum</a:t>
+            </a:r>
+            <a:r>
+              <a:rPr lang="de-DE" sz="1400" dirty="0" smtClean="0">
+                <a:solidFill>
+                  <a:schemeClr val="tx1"/>
+                </a:solidFill>
+              </a:rPr>
+              <a:t> zurück geben</a:t>
+            </a:r>
+            <a:endParaRPr lang="de-DE" sz="1400" dirty="0" smtClean="0">
+              <a:solidFill>
+                <a:schemeClr val="tx1"/>
+              </a:solidFill>
+            </a:endParaRPr>
+          </a:p>
+        </p:txBody>
+      </p:sp>
+      <p:sp>
+        <p:nvSpPr>
+          <p:cNvPr id="11" name="Abgerundetes Rechteck 10"/>
+          <p:cNvSpPr/>
+          <p:nvPr/>
+        </p:nvSpPr>
+        <p:spPr>
+          <a:xfrm>
+            <a:off x="6387737" y="4550007"/>
+            <a:ext cx="2394857" cy="1504648"/>
+          </a:xfrm>
+          <a:prstGeom prst="roundRect">
+            <a:avLst/>
+          </a:prstGeom>
+          <a:solidFill>
+            <a:schemeClr val="accent5">
+              <a:lumMod val="85000"/>
+            </a:schemeClr>
+          </a:solidFill>
+          <a:ln>
+            <a:noFill/>
+          </a:ln>
+        </p:spPr>
+        <p:style>
+          <a:lnRef idx="2">
+            <a:schemeClr val="accent1">
+              <a:shade val="50000"/>
+            </a:schemeClr>
+          </a:lnRef>
+          <a:fillRef idx="1">
+            <a:schemeClr val="accent1"/>
+          </a:fillRef>
+          <a:effectRef idx="0">
+            <a:schemeClr val="accent1"/>
+          </a:effectRef>
+          <a:fontRef idx="minor">
+            <a:schemeClr val="lt1"/>
+          </a:fontRef>
+        </p:style>
+        <p:txBody>
+          <a:bodyPr lIns="0" tIns="0" rIns="0" bIns="0" rtlCol="0" anchor="ctr"/>
+          <a:lstStyle/>
+          <a:p>
+            <a:pPr algn="ctr"/>
+            <a:r>
+              <a:rPr lang="de-DE" sz="1400" dirty="0" smtClean="0">
+                <a:solidFill>
+                  <a:schemeClr val="tx1"/>
+                </a:solidFill>
+              </a:rPr>
+              <a:t>Wird aufgerufen, wenn ihr euch bewegen dürft. Ihr habt Zugriff auf das „</a:t>
+            </a:r>
+            <a:r>
+              <a:rPr lang="de-DE" sz="1400" dirty="0" err="1" smtClean="0">
+                <a:solidFill>
+                  <a:schemeClr val="tx1"/>
+                </a:solidFill>
+              </a:rPr>
+              <a:t>surroundings</a:t>
+            </a:r>
+            <a:r>
+              <a:rPr lang="de-DE" sz="1400" dirty="0" smtClean="0">
+                <a:solidFill>
+                  <a:schemeClr val="tx1"/>
+                </a:solidFill>
+              </a:rPr>
+              <a:t>“ Array! Ihr müsst ein Move-</a:t>
+            </a:r>
+            <a:r>
+              <a:rPr lang="de-DE" sz="1400" dirty="0" err="1" smtClean="0">
+                <a:solidFill>
+                  <a:schemeClr val="tx1"/>
+                </a:solidFill>
+              </a:rPr>
+              <a:t>Enum</a:t>
+            </a:r>
+            <a:r>
+              <a:rPr lang="de-DE" sz="1400" dirty="0" smtClean="0">
+                <a:solidFill>
+                  <a:schemeClr val="tx1"/>
+                </a:solidFill>
+              </a:rPr>
+              <a:t> zurück geben</a:t>
+            </a:r>
+            <a:endParaRPr lang="de-DE" sz="1400" dirty="0" smtClean="0">
+              <a:solidFill>
+                <a:schemeClr val="tx1"/>
+              </a:solidFill>
+            </a:endParaRPr>
+          </a:p>
+        </p:txBody>
+      </p:sp>
+      <p:cxnSp>
+        <p:nvCxnSpPr>
+          <p:cNvPr id="13" name="Gerade Verbindung mit Pfeil 12"/>
+          <p:cNvCxnSpPr>
+            <a:stCxn id="10" idx="1"/>
+          </p:cNvCxnSpPr>
+          <p:nvPr/>
+        </p:nvCxnSpPr>
+        <p:spPr>
+          <a:xfrm flipH="1">
+            <a:off x="3387633" y="2615431"/>
+            <a:ext cx="1602378" cy="1216340"/>
+          </a:xfrm>
+          <a:prstGeom prst="straightConnector1">
+            <a:avLst/>
+          </a:prstGeom>
+          <a:ln>
+            <a:tailEnd type="triangle"/>
+          </a:ln>
+        </p:spPr>
+        <p:style>
+          <a:lnRef idx="3">
+            <a:schemeClr val="accent4"/>
+          </a:lnRef>
+          <a:fillRef idx="0">
+            <a:schemeClr val="accent4"/>
+          </a:fillRef>
+          <a:effectRef idx="2">
+            <a:schemeClr val="accent4"/>
+          </a:effectRef>
+          <a:fontRef idx="minor">
+            <a:schemeClr val="tx1"/>
+          </a:fontRef>
+        </p:style>
+      </p:cxnSp>
+      <p:cxnSp>
+        <p:nvCxnSpPr>
+          <p:cNvPr id="15" name="Gerade Verbindung mit Pfeil 14"/>
+          <p:cNvCxnSpPr>
+            <a:stCxn id="11" idx="1"/>
+          </p:cNvCxnSpPr>
+          <p:nvPr/>
+        </p:nvCxnSpPr>
+        <p:spPr>
+          <a:xfrm flipH="1" flipV="1">
+            <a:off x="3492137" y="4476206"/>
+            <a:ext cx="2895600" cy="826125"/>
+          </a:xfrm>
+          <a:prstGeom prst="straightConnector1">
+            <a:avLst/>
+          </a:prstGeom>
+          <a:ln>
+            <a:tailEnd type="triangle"/>
+          </a:ln>
+        </p:spPr>
+        <p:style>
+          <a:lnRef idx="3">
+            <a:schemeClr val="accent4"/>
+          </a:lnRef>
+          <a:fillRef idx="0">
+            <a:schemeClr val="accent4"/>
+          </a:fillRef>
+          <a:effectRef idx="2">
+            <a:schemeClr val="accent4"/>
+          </a:effectRef>
+          <a:fontRef idx="minor">
+            <a:schemeClr val="tx1"/>
+          </a:fontRef>
+        </p:style>
+      </p:cxnSp>
+    </p:spTree>
+    <p:extLst>
+      <p:ext uri="{BB962C8B-B14F-4D97-AF65-F5344CB8AC3E}">
+        <p14:creationId xmlns:p14="http://schemas.microsoft.com/office/powerpoint/2010/main" val="1463531484"/>
+      </p:ext>
+    </p:extLst>
+  </p:cSld>
+  <p:clrMapOvr>
+    <a:masterClrMapping/>
+  </p:clrMapOvr>
+  <mc:AlternateContent xmlns:mc="http://schemas.openxmlformats.org/markup-compatibility/2006" xmlns:p14="http://schemas.microsoft.com/office/powerpoint/2010/main">
+    <mc:Choice Requires="p14">
+      <p:transition spd="med" p14:dur="700">
+        <p:fade/>
+      </p:transition>
+    </mc:Choice>
+    <mc:Fallback xmlns="">
+      <p:transition spd="med">
+        <p:fade/>
+      </p:transition>
+    </mc:Fallback>
+  </mc:AlternateContent>
+  <p:timing>
+    <p:tnLst>
+      <p:par>
+        <p:cTn id="1" dur="indefinite" restart="never" nodeType="tmRoot"/>
+      </p:par>
+    </p:tnLst>
+  </p:timing>
+</p:sld>
+</file>
+
+<file path=ppt/slides/slide12.xml><?xml version="1.0" encoding="utf-8"?>
+<p:sld xmlns:a="http://schemas.openxmlformats.org/drawingml/2006/main" xmlns:r="http://schemas.openxmlformats.org/officeDocument/2006/relationships" xmlns:p="http://schemas.openxmlformats.org/presentationml/2006/main">
+  <p:cSld>
+    <p:spTree>
+      <p:nvGrpSpPr>
+        <p:cNvPr id="1" name=""/>
+        <p:cNvGrpSpPr/>
+        <p:nvPr/>
+      </p:nvGrpSpPr>
+      <p:grpSpPr>
+        <a:xfrm>
+          <a:off x="0" y="0"/>
+          <a:ext cx="0" cy="0"/>
+          <a:chOff x="0" y="0"/>
+          <a:chExt cx="0" cy="0"/>
+        </a:xfrm>
+      </p:grpSpPr>
+      <p:sp>
+        <p:nvSpPr>
+          <p:cNvPr id="2" name="Titel 1"/>
+          <p:cNvSpPr>
+            <a:spLocks noGrp="1"/>
+          </p:cNvSpPr>
+          <p:nvPr>
+            <p:ph type="title"/>
+          </p:nvPr>
+        </p:nvSpPr>
+        <p:spPr/>
+        <p:txBody>
+          <a:bodyPr/>
+          <a:lstStyle/>
+          <a:p>
+            <a:r>
+              <a:rPr lang="de-DE" dirty="0" smtClean="0"/>
+              <a:t>Abschluss</a:t>
+            </a:r>
+            <a:endParaRPr lang="de-DE" dirty="0"/>
+          </a:p>
+        </p:txBody>
+      </p:sp>
+      <p:sp>
+        <p:nvSpPr>
+          <p:cNvPr id="3" name="Textplatzhalter 2"/>
+          <p:cNvSpPr>
+            <a:spLocks noGrp="1"/>
+          </p:cNvSpPr>
+          <p:nvPr>
+            <p:ph type="body" sz="quarter" idx="10"/>
+          </p:nvPr>
+        </p:nvSpPr>
+        <p:spPr>
+          <a:xfrm>
+            <a:off x="365823" y="1044000"/>
+            <a:ext cx="8488766" cy="2031325"/>
+          </a:xfrm>
+        </p:spPr>
+        <p:txBody>
+          <a:bodyPr/>
+          <a:lstStyle/>
+          <a:p>
+            <a:r>
+              <a:rPr lang="de-DE" dirty="0" smtClean="0"/>
+              <a:t>Stellt sicher, dass das Programm noch funktioniert</a:t>
+            </a:r>
+          </a:p>
+          <a:p>
+            <a:endParaRPr lang="de-DE" dirty="0"/>
+          </a:p>
+          <a:p>
+            <a:r>
+              <a:rPr lang="de-DE" dirty="0" smtClean="0"/>
+              <a:t>Öffnet wieder die Kommandokonsole</a:t>
+            </a:r>
+          </a:p>
+          <a:p>
+            <a:pPr lvl="1"/>
+            <a:r>
+              <a:rPr lang="de-DE" dirty="0" err="1" smtClean="0">
+                <a:latin typeface="Consolas" panose="020B0609020204030204" pitchFamily="49" charset="0"/>
+              </a:rPr>
+              <a:t>git</a:t>
+            </a:r>
+            <a:r>
+              <a:rPr lang="de-DE" dirty="0" smtClean="0">
+                <a:latin typeface="Consolas" panose="020B0609020204030204" pitchFamily="49" charset="0"/>
+              </a:rPr>
+              <a:t> </a:t>
+            </a:r>
+            <a:r>
+              <a:rPr lang="de-DE" dirty="0" err="1" smtClean="0">
+                <a:latin typeface="Consolas" panose="020B0609020204030204" pitchFamily="49" charset="0"/>
+              </a:rPr>
+              <a:t>commit</a:t>
+            </a:r>
+            <a:r>
+              <a:rPr lang="de-DE" dirty="0" smtClean="0">
+                <a:latin typeface="Consolas" panose="020B0609020204030204" pitchFamily="49" charset="0"/>
+              </a:rPr>
+              <a:t> –a –m "Add </a:t>
+            </a:r>
+            <a:r>
+              <a:rPr lang="de-DE" dirty="0" err="1" smtClean="0">
+                <a:latin typeface="Consolas" panose="020B0609020204030204" pitchFamily="49" charset="0"/>
+              </a:rPr>
+              <a:t>new</a:t>
+            </a:r>
+            <a:r>
+              <a:rPr lang="de-DE" dirty="0" smtClean="0">
+                <a:latin typeface="Consolas" panose="020B0609020204030204" pitchFamily="49" charset="0"/>
+              </a:rPr>
+              <a:t> </a:t>
+            </a:r>
+            <a:r>
+              <a:rPr lang="de-DE" dirty="0" err="1" smtClean="0">
+                <a:latin typeface="Consolas" panose="020B0609020204030204" pitchFamily="49" charset="0"/>
+              </a:rPr>
+              <a:t>wolf</a:t>
+            </a:r>
+            <a:r>
+              <a:rPr lang="de-DE" dirty="0" smtClean="0">
+                <a:latin typeface="Consolas" panose="020B0609020204030204" pitchFamily="49" charset="0"/>
+              </a:rPr>
+              <a:t>: [Euer </a:t>
+            </a:r>
+            <a:r>
+              <a:rPr lang="de-DE" dirty="0" err="1" smtClean="0">
+                <a:latin typeface="Consolas" panose="020B0609020204030204" pitchFamily="49" charset="0"/>
+              </a:rPr>
+              <a:t>Wolfname</a:t>
+            </a:r>
+            <a:r>
+              <a:rPr lang="de-DE" dirty="0" smtClean="0">
+                <a:latin typeface="Consolas" panose="020B0609020204030204" pitchFamily="49" charset="0"/>
+              </a:rPr>
+              <a:t>]"</a:t>
+            </a:r>
+          </a:p>
+          <a:p>
+            <a:pPr lvl="1"/>
+            <a:r>
+              <a:rPr lang="de-DE" dirty="0" err="1" smtClean="0">
+                <a:latin typeface="Consolas" panose="020B0609020204030204" pitchFamily="49" charset="0"/>
+              </a:rPr>
+              <a:t>git</a:t>
+            </a:r>
+            <a:r>
+              <a:rPr lang="de-DE" dirty="0" smtClean="0">
+                <a:latin typeface="Consolas" panose="020B0609020204030204" pitchFamily="49" charset="0"/>
+              </a:rPr>
+              <a:t> push</a:t>
+            </a:r>
+          </a:p>
+          <a:p>
+            <a:pPr lvl="1"/>
+            <a:endParaRPr lang="de-DE" dirty="0" smtClean="0"/>
+          </a:p>
+          <a:p>
+            <a:r>
+              <a:rPr lang="de-DE" dirty="0" smtClean="0"/>
+              <a:t>Sagt Bescheid, und wir lassen ihn gegen die anderen Antreten!</a:t>
+            </a:r>
+            <a:endParaRPr lang="de-DE" dirty="0"/>
+          </a:p>
+        </p:txBody>
+      </p:sp>
+      <p:sp>
+        <p:nvSpPr>
+          <p:cNvPr id="4" name="Textplatzhalter 3"/>
+          <p:cNvSpPr>
+            <a:spLocks noGrp="1"/>
+          </p:cNvSpPr>
+          <p:nvPr>
+            <p:ph type="body" sz="quarter" idx="11"/>
+          </p:nvPr>
+        </p:nvSpPr>
+        <p:spPr/>
+        <p:txBody>
+          <a:bodyPr/>
+          <a:lstStyle/>
+          <a:p>
+            <a:endParaRPr lang="de-DE"/>
+          </a:p>
+        </p:txBody>
+      </p:sp>
+    </p:spTree>
+    <p:extLst>
+      <p:ext uri="{BB962C8B-B14F-4D97-AF65-F5344CB8AC3E}">
+        <p14:creationId xmlns:p14="http://schemas.microsoft.com/office/powerpoint/2010/main" val="2257173780"/>
+      </p:ext>
+    </p:extLst>
+  </p:cSld>
+  <p:clrMapOvr>
+    <a:masterClrMapping/>
+  </p:clrMapOvr>
+  <mc:AlternateContent xmlns:mc="http://schemas.openxmlformats.org/markup-compatibility/2006" xmlns:p14="http://schemas.microsoft.com/office/powerpoint/2010/main">
+    <mc:Choice Requires="p14">
+      <p:transition spd="med" p14:dur="700">
+        <p:fade/>
+      </p:transition>
+    </mc:Choice>
+    <mc:Fallback xmlns="">
+      <p:transition spd="med">
+        <p:fade/>
+      </p:transition>
+    </mc:Fallback>
+  </mc:AlternateContent>
+  <p:timing>
+    <p:tnLst>
+      <p:par>
+        <p:cTn id="1" dur="indefinite" restart="never" nodeType="tmRoot"/>
+      </p:par>
+    </p:tnLst>
+  </p:timing>
+</p:sld>
+</file>
+
+<file path=ppt/slides/slide2.xml><?xml version="1.0" encoding="utf-8"?>
 <p:sld xmlns:a="http://schemas.openxmlformats.org/drawingml/2006/main" xmlns:r="http://schemas.openxmlformats.org/officeDocument/2006/relationships" xmlns:p="http://schemas.openxmlformats.org/presentationml/2006/main" show="0">
   <p:cSld>
+    <p:bg>
+      <p:bgPr>
+        <a:solidFill>
+          <a:srgbClr val="FFC000"/>
+        </a:solidFill>
+        <a:effectLst/>
+      </p:bgPr>
+    </p:bg>
     <p:spTree>
       <p:nvGrpSpPr>
         <p:cNvPr id="1" name=""/>
@@ -14615,462 +15164,6 @@
           <a:p>
             <a:r>
               <a:rPr lang="de-DE" dirty="0"/>
-              <a:t>Agenda</a:t>
-            </a:r>
-          </a:p>
-        </p:txBody>
-      </p:sp>
-      <p:sp>
-        <p:nvSpPr>
-          <p:cNvPr id="13" name="Rechteck 12"/>
-          <p:cNvSpPr>
-            <a:spLocks noChangeArrowheads="1"/>
-          </p:cNvSpPr>
-          <p:nvPr/>
-        </p:nvSpPr>
-        <p:spPr bwMode="auto">
-          <a:xfrm>
-            <a:off x="365857" y="2532825"/>
-            <a:ext cx="576000" cy="288000"/>
-          </a:xfrm>
-          <a:prstGeom prst="rect">
-            <a:avLst/>
-          </a:prstGeom>
-          <a:solidFill>
-            <a:schemeClr val="accent1"/>
-          </a:solidFill>
-          <a:ln w="0" algn="ctr">
-            <a:noFill/>
-            <a:round/>
-            <a:headEnd/>
-            <a:tailEnd/>
-          </a:ln>
-          <a:effectLst/>
-        </p:spPr>
-        <p:txBody>
-          <a:bodyPr wrap="none" lIns="72000" tIns="0" rIns="0" bIns="0" anchor="ctr" anchorCtr="0"/>
-          <a:lstStyle/>
-          <a:p>
-            <a:pPr defTabSz="995072"/>
-            <a:r>
-              <a:rPr lang="de-DE" sz="1400" dirty="0">
-                <a:solidFill>
-                  <a:schemeClr val="bg1"/>
-                </a:solidFill>
-              </a:rPr>
-              <a:t>4</a:t>
-            </a:r>
-          </a:p>
-        </p:txBody>
-      </p:sp>
-    </p:spTree>
-    <p:extLst>
-      <p:ext uri="{BB962C8B-B14F-4D97-AF65-F5344CB8AC3E}">
-        <p14:creationId xmlns:p14="http://schemas.microsoft.com/office/powerpoint/2010/main" val="1667835585"/>
-      </p:ext>
-    </p:extLst>
-  </p:cSld>
-  <p:clrMapOvr>
-    <a:masterClrMapping/>
-  </p:clrMapOvr>
-  <mc:AlternateContent xmlns:mc="http://schemas.openxmlformats.org/markup-compatibility/2006">
-    <mc:Choice xmlns:p14="http://schemas.microsoft.com/office/powerpoint/2010/main" Requires="p14">
-      <p:transition spd="med" p14:dur="700">
-        <p:fade/>
-      </p:transition>
-    </mc:Choice>
-    <mc:Fallback>
-      <p:transition spd="med">
-        <p:fade/>
-      </p:transition>
-    </mc:Fallback>
-  </mc:AlternateContent>
-  <p:timing>
-    <p:tnLst>
-      <p:par>
-        <p:cTn id="1" dur="indefinite" restart="never" nodeType="tmRoot"/>
-      </p:par>
-    </p:tnLst>
-  </p:timing>
-</p:sld>
-</file>
-
-<file path=ppt/slides/slide12.xml><?xml version="1.0" encoding="utf-8"?>
-<p:sld xmlns:a="http://schemas.openxmlformats.org/drawingml/2006/main" xmlns:r="http://schemas.openxmlformats.org/officeDocument/2006/relationships" xmlns:p="http://schemas.openxmlformats.org/presentationml/2006/main" show="0">
-  <p:cSld>
-    <p:spTree>
-      <p:nvGrpSpPr>
-        <p:cNvPr id="1" name=""/>
-        <p:cNvGrpSpPr/>
-        <p:nvPr/>
-      </p:nvGrpSpPr>
-      <p:grpSpPr>
-        <a:xfrm>
-          <a:off x="0" y="0"/>
-          <a:ext cx="0" cy="0"/>
-          <a:chOff x="0" y="0"/>
-          <a:chExt cx="0" cy="0"/>
-        </a:xfrm>
-      </p:grpSpPr>
-      <p:sp>
-        <p:nvSpPr>
-          <p:cNvPr id="9" name="Titel 8"/>
-          <p:cNvSpPr>
-            <a:spLocks noGrp="1"/>
-          </p:cNvSpPr>
-          <p:nvPr>
-            <p:ph type="title"/>
-          </p:nvPr>
-        </p:nvSpPr>
-        <p:spPr/>
-        <p:txBody>
-          <a:bodyPr/>
-          <a:lstStyle/>
-          <a:p>
-            <a:r>
-              <a:rPr lang="de-DE" dirty="0"/>
-              <a:t>Agenda</a:t>
-            </a:r>
-          </a:p>
-        </p:txBody>
-      </p:sp>
-      <p:sp>
-        <p:nvSpPr>
-          <p:cNvPr id="8" name="Rechteck 7"/>
-          <p:cNvSpPr>
-            <a:spLocks noChangeArrowheads="1"/>
-          </p:cNvSpPr>
-          <p:nvPr/>
-        </p:nvSpPr>
-        <p:spPr bwMode="auto">
-          <a:xfrm>
-            <a:off x="365857" y="3019575"/>
-            <a:ext cx="576000" cy="288000"/>
-          </a:xfrm>
-          <a:prstGeom prst="rect">
-            <a:avLst/>
-          </a:prstGeom>
-          <a:solidFill>
-            <a:schemeClr val="accent1"/>
-          </a:solidFill>
-          <a:ln w="0" algn="ctr">
-            <a:noFill/>
-            <a:round/>
-            <a:headEnd/>
-            <a:tailEnd/>
-          </a:ln>
-          <a:effectLst/>
-        </p:spPr>
-        <p:txBody>
-          <a:bodyPr wrap="none" lIns="72000" tIns="0" rIns="0" bIns="0" anchor="ctr" anchorCtr="0"/>
-          <a:lstStyle/>
-          <a:p>
-            <a:pPr defTabSz="995072"/>
-            <a:r>
-              <a:rPr lang="de-DE" sz="1400" dirty="0">
-                <a:solidFill>
-                  <a:schemeClr val="bg1"/>
-                </a:solidFill>
-              </a:rPr>
-              <a:t>5</a:t>
-            </a:r>
-          </a:p>
-        </p:txBody>
-      </p:sp>
-    </p:spTree>
-    <p:extLst>
-      <p:ext uri="{BB962C8B-B14F-4D97-AF65-F5344CB8AC3E}">
-        <p14:creationId xmlns:p14="http://schemas.microsoft.com/office/powerpoint/2010/main" val="1524043989"/>
-      </p:ext>
-    </p:extLst>
-  </p:cSld>
-  <p:clrMapOvr>
-    <a:masterClrMapping/>
-  </p:clrMapOvr>
-  <mc:AlternateContent xmlns:mc="http://schemas.openxmlformats.org/markup-compatibility/2006">
-    <mc:Choice xmlns:p14="http://schemas.microsoft.com/office/powerpoint/2010/main" Requires="p14">
-      <p:transition spd="med" p14:dur="700">
-        <p:fade/>
-      </p:transition>
-    </mc:Choice>
-    <mc:Fallback>
-      <p:transition spd="med">
-        <p:fade/>
-      </p:transition>
-    </mc:Fallback>
-  </mc:AlternateContent>
-  <p:timing>
-    <p:tnLst>
-      <p:par>
-        <p:cTn id="1" dur="indefinite" restart="never" nodeType="tmRoot"/>
-      </p:par>
-    </p:tnLst>
-  </p:timing>
-</p:sld>
-</file>
-
-<file path=ppt/slides/slide13.xml><?xml version="1.0" encoding="utf-8"?>
-<p:sld xmlns:a="http://schemas.openxmlformats.org/drawingml/2006/main" xmlns:r="http://schemas.openxmlformats.org/officeDocument/2006/relationships" xmlns:p="http://schemas.openxmlformats.org/presentationml/2006/main" show="0">
-  <p:cSld>
-    <p:spTree>
-      <p:nvGrpSpPr>
-        <p:cNvPr id="1" name=""/>
-        <p:cNvGrpSpPr/>
-        <p:nvPr/>
-      </p:nvGrpSpPr>
-      <p:grpSpPr>
-        <a:xfrm>
-          <a:off x="0" y="0"/>
-          <a:ext cx="0" cy="0"/>
-          <a:chOff x="0" y="0"/>
-          <a:chExt cx="0" cy="0"/>
-        </a:xfrm>
-      </p:grpSpPr>
-      <p:sp>
-        <p:nvSpPr>
-          <p:cNvPr id="9" name="Titel 8"/>
-          <p:cNvSpPr>
-            <a:spLocks noGrp="1"/>
-          </p:cNvSpPr>
-          <p:nvPr>
-            <p:ph type="title"/>
-          </p:nvPr>
-        </p:nvSpPr>
-        <p:spPr/>
-        <p:txBody>
-          <a:bodyPr/>
-          <a:lstStyle/>
-          <a:p>
-            <a:r>
-              <a:rPr lang="de-DE" dirty="0"/>
-              <a:t>Agenda</a:t>
-            </a:r>
-          </a:p>
-        </p:txBody>
-      </p:sp>
-      <p:sp>
-        <p:nvSpPr>
-          <p:cNvPr id="10" name="Rechteck 9"/>
-          <p:cNvSpPr>
-            <a:spLocks noChangeArrowheads="1"/>
-          </p:cNvSpPr>
-          <p:nvPr/>
-        </p:nvSpPr>
-        <p:spPr bwMode="auto">
-          <a:xfrm>
-            <a:off x="365857" y="3506325"/>
-            <a:ext cx="576000" cy="288000"/>
-          </a:xfrm>
-          <a:prstGeom prst="rect">
-            <a:avLst/>
-          </a:prstGeom>
-          <a:solidFill>
-            <a:schemeClr val="accent1"/>
-          </a:solidFill>
-          <a:ln w="0" algn="ctr">
-            <a:noFill/>
-            <a:round/>
-            <a:headEnd/>
-            <a:tailEnd/>
-          </a:ln>
-          <a:effectLst/>
-        </p:spPr>
-        <p:txBody>
-          <a:bodyPr wrap="none" lIns="72000" tIns="0" rIns="0" bIns="0" anchor="ctr" anchorCtr="0"/>
-          <a:lstStyle/>
-          <a:p>
-            <a:pPr defTabSz="995072"/>
-            <a:r>
-              <a:rPr lang="de-DE" sz="1400" dirty="0">
-                <a:solidFill>
-                  <a:schemeClr val="bg1"/>
-                </a:solidFill>
-              </a:rPr>
-              <a:t>6</a:t>
-            </a:r>
-          </a:p>
-        </p:txBody>
-      </p:sp>
-    </p:spTree>
-    <p:extLst>
-      <p:ext uri="{BB962C8B-B14F-4D97-AF65-F5344CB8AC3E}">
-        <p14:creationId xmlns:p14="http://schemas.microsoft.com/office/powerpoint/2010/main" val="1655730834"/>
-      </p:ext>
-    </p:extLst>
-  </p:cSld>
-  <p:clrMapOvr>
-    <a:masterClrMapping/>
-  </p:clrMapOvr>
-  <mc:AlternateContent xmlns:mc="http://schemas.openxmlformats.org/markup-compatibility/2006">
-    <mc:Choice xmlns:p14="http://schemas.microsoft.com/office/powerpoint/2010/main" Requires="p14">
-      <p:transition spd="med" p14:dur="700">
-        <p:fade/>
-      </p:transition>
-    </mc:Choice>
-    <mc:Fallback>
-      <p:transition spd="med">
-        <p:fade/>
-      </p:transition>
-    </mc:Fallback>
-  </mc:AlternateContent>
-  <p:timing>
-    <p:tnLst>
-      <p:par>
-        <p:cTn id="1" dur="indefinite" restart="never" nodeType="tmRoot"/>
-      </p:par>
-    </p:tnLst>
-  </p:timing>
-</p:sld>
-</file>
-
-<file path=ppt/slides/slide14.xml><?xml version="1.0" encoding="utf-8"?>
-<p:sld xmlns:a="http://schemas.openxmlformats.org/drawingml/2006/main" xmlns:r="http://schemas.openxmlformats.org/officeDocument/2006/relationships" xmlns:p="http://schemas.openxmlformats.org/presentationml/2006/main" show="0">
-  <p:cSld>
-    <p:spTree>
-      <p:nvGrpSpPr>
-        <p:cNvPr id="1" name=""/>
-        <p:cNvGrpSpPr/>
-        <p:nvPr/>
-      </p:nvGrpSpPr>
-      <p:grpSpPr>
-        <a:xfrm>
-          <a:off x="0" y="0"/>
-          <a:ext cx="0" cy="0"/>
-          <a:chOff x="0" y="0"/>
-          <a:chExt cx="0" cy="0"/>
-        </a:xfrm>
-      </p:grpSpPr>
-      <p:sp>
-        <p:nvSpPr>
-          <p:cNvPr id="9" name="Titel 8"/>
-          <p:cNvSpPr>
-            <a:spLocks noGrp="1"/>
-          </p:cNvSpPr>
-          <p:nvPr>
-            <p:ph type="title"/>
-          </p:nvPr>
-        </p:nvSpPr>
-        <p:spPr/>
-        <p:txBody>
-          <a:bodyPr/>
-          <a:lstStyle/>
-          <a:p>
-            <a:r>
-              <a:rPr lang="de-DE" dirty="0"/>
-              <a:t>Agenda</a:t>
-            </a:r>
-          </a:p>
-        </p:txBody>
-      </p:sp>
-      <p:sp>
-        <p:nvSpPr>
-          <p:cNvPr id="11" name="Rechteck 10"/>
-          <p:cNvSpPr>
-            <a:spLocks noChangeArrowheads="1"/>
-          </p:cNvSpPr>
-          <p:nvPr/>
-        </p:nvSpPr>
-        <p:spPr bwMode="auto">
-          <a:xfrm>
-            <a:off x="365857" y="3993075"/>
-            <a:ext cx="576000" cy="288000"/>
-          </a:xfrm>
-          <a:prstGeom prst="rect">
-            <a:avLst/>
-          </a:prstGeom>
-          <a:solidFill>
-            <a:schemeClr val="accent1"/>
-          </a:solidFill>
-          <a:ln w="0" algn="ctr">
-            <a:noFill/>
-            <a:round/>
-            <a:headEnd/>
-            <a:tailEnd/>
-          </a:ln>
-          <a:effectLst/>
-        </p:spPr>
-        <p:txBody>
-          <a:bodyPr wrap="none" lIns="72000" tIns="0" rIns="0" bIns="0" anchor="ctr" anchorCtr="0"/>
-          <a:lstStyle/>
-          <a:p>
-            <a:pPr defTabSz="995072"/>
-            <a:r>
-              <a:rPr lang="de-DE" sz="1400" dirty="0">
-                <a:solidFill>
-                  <a:schemeClr val="bg1"/>
-                </a:solidFill>
-              </a:rPr>
-              <a:t>7</a:t>
-            </a:r>
-          </a:p>
-        </p:txBody>
-      </p:sp>
-    </p:spTree>
-    <p:extLst>
-      <p:ext uri="{BB962C8B-B14F-4D97-AF65-F5344CB8AC3E}">
-        <p14:creationId xmlns:p14="http://schemas.microsoft.com/office/powerpoint/2010/main" val="3992394043"/>
-      </p:ext>
-    </p:extLst>
-  </p:cSld>
-  <p:clrMapOvr>
-    <a:masterClrMapping/>
-  </p:clrMapOvr>
-  <mc:AlternateContent xmlns:mc="http://schemas.openxmlformats.org/markup-compatibility/2006">
-    <mc:Choice xmlns:p14="http://schemas.microsoft.com/office/powerpoint/2010/main" Requires="p14">
-      <p:transition spd="med" p14:dur="700">
-        <p:fade/>
-      </p:transition>
-    </mc:Choice>
-    <mc:Fallback>
-      <p:transition spd="med">
-        <p:fade/>
-      </p:transition>
-    </mc:Fallback>
-  </mc:AlternateContent>
-  <p:timing>
-    <p:tnLst>
-      <p:par>
-        <p:cTn id="1" dur="indefinite" restart="never" nodeType="tmRoot"/>
-      </p:par>
-    </p:tnLst>
-  </p:timing>
-</p:sld>
-</file>
-
-<file path=ppt/slides/slide2.xml><?xml version="1.0" encoding="utf-8"?>
-<p:sld xmlns:a="http://schemas.openxmlformats.org/drawingml/2006/main" xmlns:r="http://schemas.openxmlformats.org/officeDocument/2006/relationships" xmlns:p="http://schemas.openxmlformats.org/presentationml/2006/main" show="0">
-  <p:cSld>
-    <p:spTree>
-      <p:nvGrpSpPr>
-        <p:cNvPr id="1" name=""/>
-        <p:cNvGrpSpPr/>
-        <p:nvPr/>
-      </p:nvGrpSpPr>
-      <p:grpSpPr>
-        <a:xfrm>
-          <a:off x="0" y="0"/>
-          <a:ext cx="0" cy="0"/>
-          <a:chOff x="0" y="0"/>
-          <a:chExt cx="0" cy="0"/>
-        </a:xfrm>
-      </p:grpSpPr>
-      <p:sp>
-        <p:nvSpPr>
-          <p:cNvPr id="9" name="Titel 8"/>
-          <p:cNvSpPr>
-            <a:spLocks noGrp="1"/>
-          </p:cNvSpPr>
-          <p:nvPr>
-            <p:ph type="title"/>
-          </p:nvPr>
-        </p:nvSpPr>
-        <p:spPr/>
-        <p:txBody>
-          <a:bodyPr/>
-          <a:lstStyle/>
-          <a:p>
-            <a:r>
-              <a:rPr lang="de-DE" dirty="0"/>
               <a:t>Agenda Überblick</a:t>
             </a:r>
           </a:p>
@@ -15086,13 +15179,13 @@
   <p:clrMapOvr>
     <a:masterClrMapping/>
   </p:clrMapOvr>
-  <mc:AlternateContent xmlns:mc="http://schemas.openxmlformats.org/markup-compatibility/2006">
-    <mc:Choice xmlns:p14="http://schemas.microsoft.com/office/powerpoint/2010/main" Requires="p14">
+  <mc:AlternateContent xmlns:mc="http://schemas.openxmlformats.org/markup-compatibility/2006" xmlns:p14="http://schemas.microsoft.com/office/powerpoint/2010/main">
+    <mc:Choice Requires="p14">
       <p:transition spd="med" p14:dur="700">
         <p:fade/>
       </p:transition>
     </mc:Choice>
-    <mc:Fallback>
+    <mc:Fallback xmlns="">
       <p:transition spd="med">
         <p:fade/>
       </p:transition>
@@ -15109,8 +15202,16 @@
 </file>
 
 <file path=ppt/slides/slide3.xml><?xml version="1.0" encoding="utf-8"?>
-<p:sld xmlns:a="http://schemas.openxmlformats.org/drawingml/2006/main" xmlns:r="http://schemas.openxmlformats.org/officeDocument/2006/relationships" xmlns:p="http://schemas.openxmlformats.org/presentationml/2006/main">
+<p:sld xmlns:a="http://schemas.openxmlformats.org/drawingml/2006/main" xmlns:r="http://schemas.openxmlformats.org/officeDocument/2006/relationships" xmlns:p="http://schemas.openxmlformats.org/presentationml/2006/main" show="0">
   <p:cSld>
+    <p:bg>
+      <p:bgPr>
+        <a:solidFill>
+          <a:srgbClr val="FFC000"/>
+        </a:solidFill>
+        <a:effectLst/>
+      </p:bgPr>
+    </p:bg>
     <p:spTree>
       <p:nvGrpSpPr>
         <p:cNvPr id="1" name=""/>
@@ -15200,13 +15301,13 @@
   <p:clrMapOvr>
     <a:masterClrMapping/>
   </p:clrMapOvr>
-  <mc:AlternateContent xmlns:mc="http://schemas.openxmlformats.org/markup-compatibility/2006" xmlns:p14="http://schemas.microsoft.com/office/powerpoint/2010/main">
-    <mc:Choice Requires="p14">
+  <mc:AlternateContent xmlns:mc="http://schemas.openxmlformats.org/markup-compatibility/2006">
+    <mc:Choice xmlns:p14="http://schemas.microsoft.com/office/powerpoint/2010/main" Requires="p14">
       <p:transition spd="med" p14:dur="700">
         <p:fade/>
       </p:transition>
     </mc:Choice>
-    <mc:Fallback xmlns="">
+    <mc:Fallback>
       <p:transition spd="med">
         <p:fade/>
       </p:transition>
@@ -15223,8 +15324,16 @@
 </file>
 
 <file path=ppt/slides/slide4.xml><?xml version="1.0" encoding="utf-8"?>
-<p:sld xmlns:a="http://schemas.openxmlformats.org/drawingml/2006/main" xmlns:r="http://schemas.openxmlformats.org/officeDocument/2006/relationships" xmlns:p="http://schemas.openxmlformats.org/presentationml/2006/main">
+<p:sld xmlns:a="http://schemas.openxmlformats.org/drawingml/2006/main" xmlns:r="http://schemas.openxmlformats.org/officeDocument/2006/relationships" xmlns:p="http://schemas.openxmlformats.org/presentationml/2006/main" show="0">
   <p:cSld>
+    <p:bg>
+      <p:bgPr>
+        <a:solidFill>
+          <a:srgbClr val="FFC000"/>
+        </a:solidFill>
+        <a:effectLst/>
+      </p:bgPr>
+    </p:bg>
     <p:spTree>
       <p:nvGrpSpPr>
         <p:cNvPr id="1" name=""/>
@@ -15275,7 +15384,7 @@
         <p:spPr>
           <a:xfrm>
             <a:off x="365823" y="1044000"/>
-            <a:ext cx="8488766" cy="2923877"/>
+            <a:ext cx="8488766" cy="3159839"/>
           </a:xfrm>
         </p:spPr>
         <p:txBody>
@@ -15332,6 +15441,41 @@
             <a:endParaRPr lang="de-DE" dirty="0" smtClean="0"/>
           </a:p>
           <a:p>
+            <a:pPr lvl="2"/>
+            <a:r>
+              <a:rPr lang="de-DE" dirty="0">
+                <a:hlinkClick r:id="rId2"/>
+              </a:rPr>
+              <a:t>https://</a:t>
+            </a:r>
+            <a:r>
+              <a:rPr lang="de-DE" dirty="0" smtClean="0">
+                <a:hlinkClick r:id="rId2"/>
+              </a:rPr>
+              <a:t>github.com/Nijin22/actico-code-challenge-wolf</a:t>
+            </a:r>
+            <a:r>
+              <a:rPr lang="de-DE" dirty="0" smtClean="0"/>
+              <a:t> klonen</a:t>
+            </a:r>
+          </a:p>
+          <a:p>
+            <a:pPr lvl="2"/>
+            <a:r>
+              <a:rPr lang="de-DE" dirty="0" smtClean="0"/>
+              <a:t>Account einrichten, die auf das </a:t>
+            </a:r>
+            <a:r>
+              <a:rPr lang="de-DE" dirty="0" err="1" smtClean="0"/>
+              <a:t>Repo</a:t>
+            </a:r>
+            <a:r>
+              <a:rPr lang="de-DE" dirty="0" smtClean="0"/>
+              <a:t> pushen dürfen</a:t>
+            </a:r>
+            <a:endParaRPr lang="de-DE" dirty="0" smtClean="0"/>
+          </a:p>
+          <a:p>
             <a:pPr lvl="1"/>
             <a:r>
               <a:rPr lang="de-DE" dirty="0" smtClean="0"/>
@@ -15356,29 +15500,6 @@
           </a:p>
           <a:p>
             <a:pPr lvl="1"/>
-            <a:endParaRPr lang="de-DE" dirty="0"/>
-          </a:p>
-          <a:p>
-            <a:r>
-              <a:rPr lang="de-DE" dirty="0" smtClean="0"/>
-              <a:t>Teilnehmer benötigen </a:t>
-            </a:r>
-            <a:r>
-              <a:rPr lang="de-DE" dirty="0" err="1" smtClean="0"/>
-              <a:t>GitHub</a:t>
-            </a:r>
-            <a:r>
-              <a:rPr lang="de-DE" dirty="0" smtClean="0"/>
-              <a:t> </a:t>
-            </a:r>
-            <a:r>
-              <a:rPr lang="de-DE" dirty="0" err="1" smtClean="0"/>
-              <a:t>account</a:t>
-            </a:r>
-            <a:r>
-              <a:rPr lang="de-DE" dirty="0" smtClean="0"/>
-              <a:t>:</a:t>
-            </a:r>
             <a:endParaRPr lang="de-DE" dirty="0"/>
           </a:p>
         </p:txBody>
@@ -15412,13 +15533,13 @@
   <p:clrMapOvr>
     <a:masterClrMapping/>
   </p:clrMapOvr>
-  <mc:AlternateContent xmlns:mc="http://schemas.openxmlformats.org/markup-compatibility/2006" xmlns:p14="http://schemas.microsoft.com/office/powerpoint/2010/main">
-    <mc:Choice Requires="p14">
+  <mc:AlternateContent xmlns:mc="http://schemas.openxmlformats.org/markup-compatibility/2006">
+    <mc:Choice xmlns:p14="http://schemas.microsoft.com/office/powerpoint/2010/main" Requires="p14">
       <p:transition spd="med" p14:dur="700">
         <p:fade/>
       </p:transition>
     </mc:Choice>
-    <mc:Fallback xmlns="">
+    <mc:Fallback>
       <p:transition spd="med">
         <p:fade/>
       </p:transition>
@@ -15601,7 +15722,7 @@
         <p:spPr>
           <a:xfrm>
             <a:off x="365823" y="1043999"/>
-            <a:ext cx="4140000" cy="2174954"/>
+            <a:ext cx="4140000" cy="3262432"/>
           </a:xfrm>
         </p:spPr>
         <p:txBody>
@@ -15610,19 +15731,42 @@
           <a:p>
             <a:r>
               <a:rPr lang="de-DE" dirty="0" smtClean="0"/>
-              <a:t>Jeder Teilnehmer programmiert einen „Wolf“ der versucht, in der Wildnis zu überleben.</a:t>
-            </a:r>
-          </a:p>
-          <a:p>
+              <a:t>Jedes Team programmiert eine </a:t>
+            </a:r>
             <a:r>
               <a:rPr lang="de-DE" dirty="0" smtClean="0"/>
-              <a:t>Die Simulation läuft für eine 10 Sekunden</a:t>
-            </a:r>
-          </a:p>
-          <a:p>
+              <a:t>„</a:t>
+            </a:r>
             <a:r>
               <a:rPr lang="de-DE" dirty="0" smtClean="0"/>
-              <a:t>Welcher Wolf am Ende noch am meisten Überlebende hat, gewinnt!</a:t>
+              <a:t>Wolf-Rasse“, die versucht</a:t>
+            </a:r>
+            <a:r>
+              <a:rPr lang="de-DE" dirty="0" smtClean="0"/>
+              <a:t>, in der Wildnis zu überleben.</a:t>
+            </a:r>
+          </a:p>
+          <a:p>
+            <a:endParaRPr lang="de-DE" dirty="0" smtClean="0"/>
+          </a:p>
+          <a:p>
+            <a:r>
+              <a:rPr lang="de-DE" dirty="0" smtClean="0"/>
+              <a:t>Eine Simulation lässt eure Wölfe gegen Bären, Löwen, Steine und die Wölfe der anderen Teams antreten</a:t>
+            </a:r>
+            <a:endParaRPr lang="de-DE" dirty="0" smtClean="0"/>
+          </a:p>
+          <a:p>
+            <a:endParaRPr lang="de-DE" dirty="0" smtClean="0"/>
+          </a:p>
+          <a:p>
+            <a:r>
+              <a:rPr lang="de-DE" dirty="0" smtClean="0"/>
+              <a:t>Welcher </a:t>
+            </a:r>
+            <a:r>
+              <a:rPr lang="de-DE" dirty="0" smtClean="0"/>
+              <a:t>Wolf am Ende noch am meisten Überlebende hat, gewinnt!</a:t>
             </a:r>
           </a:p>
           <a:p>
@@ -15718,7 +15862,6 @@
               <a:rPr lang="de-DE" sz="1200" dirty="0" smtClean="0"/>
               <a:t>Aber dort bitte keine Ideen klauen ;)</a:t>
             </a:r>
-            <a:endParaRPr lang="de-DE" sz="1200" dirty="0" smtClean="0"/>
           </a:p>
         </p:txBody>
       </p:sp>
@@ -15837,7 +15980,7 @@
         <p:spPr>
           <a:xfrm>
             <a:off x="365823" y="1044000"/>
-            <a:ext cx="8488766" cy="4411464"/>
+            <a:ext cx="8488766" cy="4708981"/>
           </a:xfrm>
         </p:spPr>
         <p:txBody>
@@ -15867,8 +16010,13 @@
             <a:pPr lvl="1"/>
             <a:r>
               <a:rPr lang="de-DE" dirty="0" smtClean="0"/>
-              <a:t>Zu Beginn: 100 Instanzen pro Teilnehmer</a:t>
-            </a:r>
+              <a:t>Zu Beginn: 100 Instanzen pro </a:t>
+            </a:r>
+            <a:r>
+              <a:rPr lang="de-DE" dirty="0" smtClean="0"/>
+              <a:t>Art und Team</a:t>
+            </a:r>
+            <a:endParaRPr lang="de-DE" dirty="0" smtClean="0"/>
           </a:p>
           <a:p>
             <a:pPr lvl="1"/>
@@ -15933,14 +16081,38 @@
             <a:pPr lvl="1"/>
             <a:r>
               <a:rPr lang="de-DE" dirty="0" smtClean="0"/>
-              <a:t>Jeder Teilnehmer erhält die Art des Gegners als Parameter</a:t>
-            </a:r>
+              <a:t>Jeder Teilnehmer erhält die Art des Gegners als </a:t>
+            </a:r>
+            <a:r>
+              <a:rPr lang="de-DE" dirty="0" smtClean="0"/>
+              <a:t>Parameter (Wolf, Stein, Löwe, Bär)</a:t>
+            </a:r>
+            <a:endParaRPr lang="de-DE" dirty="0" smtClean="0"/>
           </a:p>
           <a:p>
             <a:pPr lvl="1"/>
             <a:r>
               <a:rPr lang="de-DE" dirty="0" smtClean="0"/>
-              <a:t>Bei gleichem Ergebnis, entscheidet der Zufall</a:t>
+              <a:t>Bei gleichem </a:t>
+            </a:r>
+            <a:r>
+              <a:rPr lang="de-DE" dirty="0" smtClean="0"/>
+              <a:t>Wurf, </a:t>
+            </a:r>
+            <a:r>
+              <a:rPr lang="de-DE" dirty="0" smtClean="0"/>
+              <a:t>entscheidet der </a:t>
+            </a:r>
+            <a:r>
+              <a:rPr lang="de-DE" dirty="0" smtClean="0"/>
+              <a:t>Zufall</a:t>
+            </a:r>
+          </a:p>
+          <a:p>
+            <a:pPr lvl="1"/>
+            <a:r>
+              <a:rPr lang="de-DE" dirty="0" smtClean="0"/>
+              <a:t>Der Verlierer wird aus dem Spiel entfernt</a:t>
             </a:r>
             <a:endParaRPr lang="de-DE" dirty="0"/>
           </a:p>
@@ -16031,7 +16203,7 @@
           <a:p>
             <a:r>
               <a:rPr lang="de-DE" dirty="0" smtClean="0"/>
-              <a:t>Arten</a:t>
+              <a:t>Arten von Tieren</a:t>
             </a:r>
             <a:endParaRPr lang="de-DE" dirty="0"/>
           </a:p>

</xml_diff>

<commit_message>
Add minor clarification to powerpoint
</commit_message>
<xml_diff>
--- a/media/powerpoint.pptx
+++ b/media/powerpoint.pptx
@@ -28,14 +28,14 @@
   <p:notesSz cx="6797675" cy="9926638"/>
   <p:embeddedFontLst>
     <p:embeddedFont>
-      <p:font typeface="Consolas" panose="020B0609020204030204" pitchFamily="49" charset="0"/>
+      <p:font typeface="Fira Sans" panose="020B0503050000020004" pitchFamily="34" charset="0"/>
       <p:regular r:id="rId16"/>
       <p:bold r:id="rId17"/>
       <p:italic r:id="rId18"/>
       <p:boldItalic r:id="rId19"/>
     </p:embeddedFont>
     <p:embeddedFont>
-      <p:font typeface="Fira Sans" panose="020B0503050000020004" pitchFamily="34" charset="0"/>
+      <p:font typeface="Consolas" panose="020B0609020204030204" pitchFamily="49" charset="0"/>
       <p:regular r:id="rId20"/>
       <p:bold r:id="rId21"/>
       <p:italic r:id="rId22"/>
@@ -272,7 +272,7 @@
                 <a:latin typeface="Fira Sans" pitchFamily="34" charset="0"/>
               </a:rPr>
               <a:pPr/>
-              <a:t>2018-04-12</a:t>
+              <a:t>2018-04-16</a:t>
             </a:fld>
             <a:endParaRPr lang="de-DE" dirty="0">
               <a:latin typeface="Fira Sans" pitchFamily="34" charset="0"/>
@@ -451,7 +451,7 @@
             <a:fld id="{508B489F-89BA-4A83-9D2B-E0B2D4476E33}" type="datetimeFigureOut">
               <a:rPr lang="de-DE" smtClean="0"/>
               <a:pPr/>
-              <a:t>2018-04-12</a:t>
+              <a:t>2018-04-16</a:t>
             </a:fld>
             <a:endParaRPr lang="de-DE" dirty="0"/>
           </a:p>
@@ -1343,7 +1343,7 @@
                   <a:spcPts val="0"/>
                 </a:spcAft>
               </a:pPr>
-              <a:t>2018-04-12</a:t>
+              <a:t>2018-04-16</a:t>
             </a:fld>
             <a:endParaRPr lang="de-DE" sz="800" dirty="0">
               <a:solidFill>
@@ -7638,7 +7638,7 @@
                   <a:spcPts val="0"/>
                 </a:spcAft>
               </a:pPr>
-              <a:t>2018-04-12</a:t>
+              <a:t>2018-04-16</a:t>
             </a:fld>
             <a:endParaRPr lang="de-DE" sz="800" dirty="0">
               <a:solidFill>
@@ -13413,7 +13413,7 @@
                   <a:srgbClr val="707070"/>
                 </a:solidFill>
               </a:rPr>
-              <a:t>2018-04-12</a:t>
+              <a:t>2018-04-16</a:t>
             </a:fld>
             <a:r>
               <a:rPr lang="de-DE" sz="800" dirty="0">
@@ -13885,11 +13885,7 @@
           <a:p>
             <a:r>
               <a:rPr lang="de-DE" dirty="0" smtClean="0"/>
-              <a:t>ACTICO Code </a:t>
-            </a:r>
-            <a:r>
-              <a:rPr lang="de-DE" dirty="0" smtClean="0"/>
-              <a:t>Challenge</a:t>
+              <a:t>ACTICO Code Challenge</a:t>
             </a:r>
             <a:endParaRPr lang="de-DE" dirty="0"/>
           </a:p>
@@ -14253,7 +14249,15 @@
             <a:pPr lvl="1"/>
             <a:r>
               <a:rPr lang="de-DE" dirty="0" smtClean="0"/>
-              <a:t>Denkt euch einen Namen für euren Wolf aus</a:t>
+              <a:t>Denkt euch einen Namen für </a:t>
+            </a:r>
+            <a:r>
+              <a:rPr lang="de-DE" dirty="0" smtClean="0"/>
+              <a:t>eure Wolf-Rasse </a:t>
+            </a:r>
+            <a:r>
+              <a:rPr lang="de-DE" dirty="0" smtClean="0"/>
+              <a:t>aus</a:t>
             </a:r>
           </a:p>
           <a:p>
@@ -14290,8 +14294,17 @@
               <a:rPr lang="de-DE" b="1" dirty="0" smtClean="0">
                 <a:latin typeface="Consolas" panose="020B0609020204030204" pitchFamily="49" charset="0"/>
               </a:rPr>
-              <a:t> [Euer Wolf Name]</a:t>
-            </a:r>
+              <a:t> </a:t>
+            </a:r>
+            <a:r>
+              <a:rPr lang="de-DE" b="1" dirty="0" smtClean="0">
+                <a:latin typeface="Consolas" panose="020B0609020204030204" pitchFamily="49" charset="0"/>
+              </a:rPr>
+              <a:t>[Rassenname]</a:t>
+            </a:r>
+            <a:endParaRPr lang="de-DE" b="1" dirty="0" smtClean="0">
+              <a:latin typeface="Consolas" panose="020B0609020204030204" pitchFamily="49" charset="0"/>
+            </a:endParaRPr>
           </a:p>
           <a:p>
             <a:pPr lvl="1"/>
@@ -14421,14 +14434,10 @@
   </p:clrMapOvr>
   <mc:AlternateContent xmlns:mc="http://schemas.openxmlformats.org/markup-compatibility/2006" xmlns:p14="http://schemas.microsoft.com/office/powerpoint/2010/main">
     <mc:Choice Requires="p14">
-      <p:transition spd="med" p14:dur="700">
-        <p:fade/>
-      </p:transition>
+      <p:transition p14:dur="0"/>
     </mc:Choice>
     <mc:Fallback xmlns="">
-      <p:transition spd="med">
-        <p:fade/>
-      </p:transition>
+      <p:transition/>
     </mc:Fallback>
   </mc:AlternateContent>
   <p:timing>
@@ -14595,11 +14604,6 @@
               </a:rPr>
               <a:t>Hier zum testen eures Wolfs klicken</a:t>
             </a:r>
-            <a:endParaRPr lang="de-DE" sz="1400" dirty="0" smtClean="0">
-              <a:solidFill>
-                <a:schemeClr val="tx1"/>
-              </a:solidFill>
-            </a:endParaRPr>
           </a:p>
         </p:txBody>
       </p:sp>
@@ -14704,11 +14708,6 @@
               </a:rPr>
               <a:t> zurück geben</a:t>
             </a:r>
-            <a:endParaRPr lang="de-DE" sz="1400" dirty="0" smtClean="0">
-              <a:solidFill>
-                <a:schemeClr val="tx1"/>
-              </a:solidFill>
-            </a:endParaRPr>
           </a:p>
         </p:txBody>
       </p:sp>
@@ -14796,11 +14795,6 @@
               </a:rPr>
               <a:t> zurück geben</a:t>
             </a:r>
-            <a:endParaRPr lang="de-DE" sz="1400" dirty="0" smtClean="0">
-              <a:solidFill>
-                <a:schemeClr val="tx1"/>
-              </a:solidFill>
-            </a:endParaRPr>
           </a:p>
         </p:txBody>
       </p:sp>
@@ -14886,14 +14880,10 @@
   </p:clrMapOvr>
   <mc:AlternateContent xmlns:mc="http://schemas.openxmlformats.org/markup-compatibility/2006" xmlns:p14="http://schemas.microsoft.com/office/powerpoint/2010/main">
     <mc:Choice Requires="p14">
-      <p:transition spd="med" p14:dur="700">
-        <p:fade/>
-      </p:transition>
+      <p:transition p14:dur="0"/>
     </mc:Choice>
     <mc:Fallback xmlns="">
-      <p:transition spd="med">
-        <p:fade/>
-      </p:transition>
+      <p:transition/>
     </mc:Fallback>
   </mc:AlternateContent>
   <p:timing>
@@ -15102,14 +15092,10 @@
   </p:clrMapOvr>
   <mc:AlternateContent xmlns:mc="http://schemas.openxmlformats.org/markup-compatibility/2006" xmlns:p14="http://schemas.microsoft.com/office/powerpoint/2010/main">
     <mc:Choice Requires="p14">
-      <p:transition spd="med" p14:dur="700">
-        <p:fade/>
-      </p:transition>
+      <p:transition p14:dur="0"/>
     </mc:Choice>
     <mc:Fallback xmlns="">
-      <p:transition spd="med">
-        <p:fade/>
-      </p:transition>
+      <p:transition/>
     </mc:Fallback>
   </mc:AlternateContent>
   <p:timing>
@@ -15181,14 +15167,10 @@
   </p:clrMapOvr>
   <mc:AlternateContent xmlns:mc="http://schemas.openxmlformats.org/markup-compatibility/2006" xmlns:p14="http://schemas.microsoft.com/office/powerpoint/2010/main">
     <mc:Choice Requires="p14">
-      <p:transition spd="med" p14:dur="700">
-        <p:fade/>
-      </p:transition>
+      <p:transition p14:dur="0"/>
     </mc:Choice>
     <mc:Fallback xmlns="">
-      <p:transition spd="med">
-        <p:fade/>
-      </p:transition>
+      <p:transition/>
     </mc:Fallback>
   </mc:AlternateContent>
   <p:timing>
@@ -15301,16 +15283,12 @@
   <p:clrMapOvr>
     <a:masterClrMapping/>
   </p:clrMapOvr>
-  <mc:AlternateContent xmlns:mc="http://schemas.openxmlformats.org/markup-compatibility/2006">
-    <mc:Choice xmlns:p14="http://schemas.microsoft.com/office/powerpoint/2010/main" Requires="p14">
-      <p:transition spd="med" p14:dur="700">
-        <p:fade/>
-      </p:transition>
+  <mc:AlternateContent xmlns:mc="http://schemas.openxmlformats.org/markup-compatibility/2006" xmlns:p14="http://schemas.microsoft.com/office/powerpoint/2010/main">
+    <mc:Choice Requires="p14">
+      <p:transition p14:dur="0"/>
     </mc:Choice>
-    <mc:Fallback>
-      <p:transition spd="med">
-        <p:fade/>
-      </p:transition>
+    <mc:Fallback xmlns="">
+      <p:transition/>
     </mc:Fallback>
   </mc:AlternateContent>
   <p:timing>
@@ -15473,7 +15451,6 @@
               <a:rPr lang="de-DE" dirty="0" smtClean="0"/>
               <a:t> pushen dürfen</a:t>
             </a:r>
-            <a:endParaRPr lang="de-DE" dirty="0" smtClean="0"/>
           </a:p>
           <a:p>
             <a:pPr lvl="1"/>
@@ -15533,16 +15510,12 @@
   <p:clrMapOvr>
     <a:masterClrMapping/>
   </p:clrMapOvr>
-  <mc:AlternateContent xmlns:mc="http://schemas.openxmlformats.org/markup-compatibility/2006">
-    <mc:Choice xmlns:p14="http://schemas.microsoft.com/office/powerpoint/2010/main" Requires="p14">
-      <p:transition spd="med" p14:dur="700">
-        <p:fade/>
-      </p:transition>
+  <mc:AlternateContent xmlns:mc="http://schemas.openxmlformats.org/markup-compatibility/2006" xmlns:p14="http://schemas.microsoft.com/office/powerpoint/2010/main">
+    <mc:Choice Requires="p14">
+      <p:transition p14:dur="0"/>
     </mc:Choice>
-    <mc:Fallback>
-      <p:transition spd="med">
-        <p:fade/>
-      </p:transition>
+    <mc:Fallback xmlns="">
+      <p:transition/>
     </mc:Fallback>
   </mc:AlternateContent>
   <p:timing>
@@ -15649,14 +15622,10 @@
   </p:clrMapOvr>
   <mc:AlternateContent xmlns:mc="http://schemas.openxmlformats.org/markup-compatibility/2006" xmlns:p14="http://schemas.microsoft.com/office/powerpoint/2010/main">
     <mc:Choice Requires="p14">
-      <p:transition spd="med" p14:dur="700">
-        <p:fade/>
-      </p:transition>
+      <p:transition p14:dur="0"/>
     </mc:Choice>
     <mc:Fallback xmlns="">
-      <p:transition spd="med">
-        <p:fade/>
-      </p:transition>
+      <p:transition/>
     </mc:Fallback>
   </mc:AlternateContent>
   <p:timing>
@@ -15731,19 +15700,7 @@
           <a:p>
             <a:r>
               <a:rPr lang="de-DE" dirty="0" smtClean="0"/>
-              <a:t>Jedes Team programmiert eine </a:t>
-            </a:r>
-            <a:r>
-              <a:rPr lang="de-DE" dirty="0" smtClean="0"/>
-              <a:t>„</a:t>
-            </a:r>
-            <a:r>
-              <a:rPr lang="de-DE" dirty="0" smtClean="0"/>
-              <a:t>Wolf-Rasse“, die versucht</a:t>
-            </a:r>
-            <a:r>
-              <a:rPr lang="de-DE" dirty="0" smtClean="0"/>
-              <a:t>, in der Wildnis zu überleben.</a:t>
+              <a:t>Jedes Team programmiert eine „Wolf-Rasse“, die versucht, in der Wildnis zu überleben.</a:t>
             </a:r>
           </a:p>
           <a:p>
@@ -15754,19 +15711,18 @@
               <a:rPr lang="de-DE" dirty="0" smtClean="0"/>
               <a:t>Eine Simulation lässt eure Wölfe gegen Bären, Löwen, Steine und die Wölfe der anderen Teams antreten</a:t>
             </a:r>
+          </a:p>
+          <a:p>
             <a:endParaRPr lang="de-DE" dirty="0" smtClean="0"/>
           </a:p>
           <a:p>
-            <a:endParaRPr lang="de-DE" dirty="0" smtClean="0"/>
-          </a:p>
-          <a:p>
             <a:r>
               <a:rPr lang="de-DE" dirty="0" smtClean="0"/>
-              <a:t>Welcher </a:t>
+              <a:t>Die Rasse, welche am </a:t>
             </a:r>
             <a:r>
               <a:rPr lang="de-DE" dirty="0" smtClean="0"/>
-              <a:t>Wolf am Ende noch am meisten Überlebende hat, gewinnt!</a:t>
+              <a:t>Ende noch am meisten Überlebende hat, gewinnt!</a:t>
             </a:r>
           </a:p>
           <a:p>
@@ -15907,14 +15863,10 @@
   </p:clrMapOvr>
   <mc:AlternateContent xmlns:mc="http://schemas.openxmlformats.org/markup-compatibility/2006" xmlns:p14="http://schemas.microsoft.com/office/powerpoint/2010/main">
     <mc:Choice Requires="p14">
-      <p:transition spd="med" p14:dur="700">
-        <p:fade/>
-      </p:transition>
+      <p:transition p14:dur="0"/>
     </mc:Choice>
     <mc:Fallback xmlns="">
-      <p:transition spd="med">
-        <p:fade/>
-      </p:transition>
+      <p:transition/>
     </mc:Fallback>
   </mc:AlternateContent>
   <p:timing>
@@ -16010,13 +15962,8 @@
             <a:pPr lvl="1"/>
             <a:r>
               <a:rPr lang="de-DE" dirty="0" smtClean="0"/>
-              <a:t>Zu Beginn: 100 Instanzen pro </a:t>
-            </a:r>
-            <a:r>
-              <a:rPr lang="de-DE" dirty="0" smtClean="0"/>
-              <a:t>Art und Team</a:t>
-            </a:r>
-            <a:endParaRPr lang="de-DE" dirty="0" smtClean="0"/>
+              <a:t>Zu Beginn: 100 Instanzen pro Art und Team</a:t>
+            </a:r>
           </a:p>
           <a:p>
             <a:pPr lvl="1"/>
@@ -16081,31 +16028,14 @@
             <a:pPr lvl="1"/>
             <a:r>
               <a:rPr lang="de-DE" dirty="0" smtClean="0"/>
-              <a:t>Jeder Teilnehmer erhält die Art des Gegners als </a:t>
-            </a:r>
+              <a:t>Jeder Teilnehmer erhält die Art des Gegners als Parameter (Wolf, Stein, Löwe, Bär)</a:t>
+            </a:r>
+          </a:p>
+          <a:p>
+            <a:pPr lvl="1"/>
             <a:r>
               <a:rPr lang="de-DE" dirty="0" smtClean="0"/>
-              <a:t>Parameter (Wolf, Stein, Löwe, Bär)</a:t>
-            </a:r>
-            <a:endParaRPr lang="de-DE" dirty="0" smtClean="0"/>
-          </a:p>
-          <a:p>
-            <a:pPr lvl="1"/>
-            <a:r>
-              <a:rPr lang="de-DE" dirty="0" smtClean="0"/>
-              <a:t>Bei gleichem </a:t>
-            </a:r>
-            <a:r>
-              <a:rPr lang="de-DE" dirty="0" smtClean="0"/>
-              <a:t>Wurf, </a:t>
-            </a:r>
-            <a:r>
-              <a:rPr lang="de-DE" dirty="0" smtClean="0"/>
-              <a:t>entscheidet der </a:t>
-            </a:r>
-            <a:r>
-              <a:rPr lang="de-DE" dirty="0" smtClean="0"/>
-              <a:t>Zufall</a:t>
+              <a:t>Bei gleichem Wurf, entscheidet der Zufall</a:t>
             </a:r>
           </a:p>
           <a:p>
@@ -16149,14 +16079,10 @@
   </p:clrMapOvr>
   <mc:AlternateContent xmlns:mc="http://schemas.openxmlformats.org/markup-compatibility/2006" xmlns:p14="http://schemas.microsoft.com/office/powerpoint/2010/main">
     <mc:Choice Requires="p14">
-      <p:transition spd="med" p14:dur="700">
-        <p:fade/>
-      </p:transition>
+      <p:transition p14:dur="0"/>
     </mc:Choice>
     <mc:Fallback xmlns="">
-      <p:transition spd="med">
-        <p:fade/>
-      </p:transition>
+      <p:transition/>
     </mc:Fallback>
   </mc:AlternateContent>
   <p:timing>
@@ -16362,14 +16288,10 @@
   </p:clrMapOvr>
   <mc:AlternateContent xmlns:mc="http://schemas.openxmlformats.org/markup-compatibility/2006" xmlns:p14="http://schemas.microsoft.com/office/powerpoint/2010/main">
     <mc:Choice Requires="p14">
-      <p:transition spd="med" p14:dur="700">
-        <p:fade/>
-      </p:transition>
+      <p:transition p14:dur="0"/>
     </mc:Choice>
     <mc:Fallback xmlns="">
-      <p:transition spd="med">
-        <p:fade/>
-      </p:transition>
+      <p:transition/>
     </mc:Fallback>
   </mc:AlternateContent>
   <p:timing>
@@ -16476,14 +16398,10 @@
   </p:clrMapOvr>
   <mc:AlternateContent xmlns:mc="http://schemas.openxmlformats.org/markup-compatibility/2006" xmlns:p14="http://schemas.microsoft.com/office/powerpoint/2010/main">
     <mc:Choice Requires="p14">
-      <p:transition spd="med" p14:dur="700">
-        <p:fade/>
-      </p:transition>
+      <p:transition p14:dur="0"/>
     </mc:Choice>
     <mc:Fallback xmlns="">
-      <p:transition spd="med">
-        <p:fade/>
-      </p:transition>
+      <p:transition/>
     </mc:Fallback>
   </mc:AlternateContent>
   <p:timing>

</xml_diff>

<commit_message>
Fix missing checkout command in instructions
</commit_message>
<xml_diff>
--- a/media/powerpoint.pptx
+++ b/media/powerpoint.pptx
@@ -272,7 +272,7 @@
                 <a:latin typeface="Fira Sans" pitchFamily="34" charset="0"/>
               </a:rPr>
               <a:pPr/>
-              <a:t>2018-04-16</a:t>
+              <a:t>2018-04-18</a:t>
             </a:fld>
             <a:endParaRPr lang="de-DE" dirty="0">
               <a:latin typeface="Fira Sans" pitchFamily="34" charset="0"/>
@@ -451,7 +451,7 @@
             <a:fld id="{508B489F-89BA-4A83-9D2B-E0B2D4476E33}" type="datetimeFigureOut">
               <a:rPr lang="de-DE" smtClean="0"/>
               <a:pPr/>
-              <a:t>2018-04-16</a:t>
+              <a:t>2018-04-18</a:t>
             </a:fld>
             <a:endParaRPr lang="de-DE" dirty="0"/>
           </a:p>
@@ -1343,7 +1343,7 @@
                   <a:spcPts val="0"/>
                 </a:spcAft>
               </a:pPr>
-              <a:t>2018-04-16</a:t>
+              <a:t>2018-04-18</a:t>
             </a:fld>
             <a:endParaRPr lang="de-DE" sz="800" dirty="0">
               <a:solidFill>
@@ -7638,7 +7638,7 @@
                   <a:spcPts val="0"/>
                 </a:spcAft>
               </a:pPr>
-              <a:t>2018-04-16</a:t>
+              <a:t>2018-04-18</a:t>
             </a:fld>
             <a:endParaRPr lang="de-DE" sz="800" dirty="0">
               <a:solidFill>
@@ -13413,7 +13413,7 @@
                   <a:srgbClr val="707070"/>
                 </a:solidFill>
               </a:rPr>
-              <a:t>2018-04-16</a:t>
+              <a:t>2018-04-18</a:t>
             </a:fld>
             <a:r>
               <a:rPr lang="de-DE" sz="800" dirty="0">
@@ -14249,15 +14249,7 @@
             <a:pPr lvl="1"/>
             <a:r>
               <a:rPr lang="de-DE" dirty="0" smtClean="0"/>
-              <a:t>Denkt euch einen Namen für </a:t>
-            </a:r>
-            <a:r>
-              <a:rPr lang="de-DE" dirty="0" smtClean="0"/>
-              <a:t>eure Wolf-Rasse </a:t>
-            </a:r>
-            <a:r>
-              <a:rPr lang="de-DE" dirty="0" smtClean="0"/>
-              <a:t>aus</a:t>
+              <a:t>Denkt euch einen Namen für eure Wolf-Rasse aus</a:t>
             </a:r>
           </a:p>
           <a:p>
@@ -14288,10 +14280,22 @@
               <a:rPr lang="de-DE" b="1" dirty="0" err="1" smtClean="0">
                 <a:latin typeface="Consolas" panose="020B0609020204030204" pitchFamily="49" charset="0"/>
               </a:rPr>
-              <a:t>branch</a:t>
-            </a:r>
-            <a:r>
-              <a:rPr lang="de-DE" b="1" dirty="0" smtClean="0">
+              <a:t>chec</a:t>
+            </a:r>
+            <a:r>
+              <a:rPr lang="de-DE" b="1" dirty="0" err="1" smtClean="0">
+                <a:latin typeface="Consolas" panose="020B0609020204030204" pitchFamily="49" charset="0"/>
+              </a:rPr>
+              <a:t>ckout</a:t>
+            </a:r>
+            <a:r>
+              <a:rPr lang="de-DE" b="1" smtClean="0">
+                <a:latin typeface="Consolas" panose="020B0609020204030204" pitchFamily="49" charset="0"/>
+              </a:rPr>
+              <a:t> -b</a:t>
+            </a:r>
+            <a:r>
+              <a:rPr lang="de-DE" b="1" smtClean="0">
                 <a:latin typeface="Consolas" panose="020B0609020204030204" pitchFamily="49" charset="0"/>
               </a:rPr>
               <a:t> </a:t>
@@ -14302,9 +14306,6 @@
               </a:rPr>
               <a:t>[Rassenname]</a:t>
             </a:r>
-            <a:endParaRPr lang="de-DE" b="1" dirty="0" smtClean="0">
-              <a:latin typeface="Consolas" panose="020B0609020204030204" pitchFamily="49" charset="0"/>
-            </a:endParaRPr>
           </a:p>
           <a:p>
             <a:pPr lvl="1"/>
@@ -15718,11 +15719,7 @@
           <a:p>
             <a:r>
               <a:rPr lang="de-DE" dirty="0" smtClean="0"/>
-              <a:t>Die Rasse, welche am </a:t>
-            </a:r>
-            <a:r>
-              <a:rPr lang="de-DE" dirty="0" smtClean="0"/>
-              <a:t>Ende noch am meisten Überlebende hat, gewinnt!</a:t>
+              <a:t>Die Rasse, welche am Ende noch am meisten Überlebende hat, gewinnt!</a:t>
             </a:r>
           </a:p>
           <a:p>

</xml_diff>

<commit_message>
Fix documentation about how to import the project
</commit_message>
<xml_diff>
--- a/media/powerpoint.pptx
+++ b/media/powerpoint.pptx
@@ -28,7 +28,7 @@
   <p:notesSz cx="6797675" cy="9926638"/>
   <p:embeddedFontLst>
     <p:embeddedFont>
-      <p:font typeface="Fira Sans" panose="020B0503050000020004" pitchFamily="34" charset="0"/>
+      <p:font typeface="Fira Sans" panose="020B0604020202020204" charset="0"/>
       <p:regular r:id="rId16"/>
       <p:bold r:id="rId17"/>
       <p:italic r:id="rId18"/>
@@ -853,10 +853,9 @@
           <a:lstStyle/>
           <a:p>
             <a:r>
-              <a:rPr lang="de-DE" dirty="0" smtClean="0"/>
+              <a:rPr lang="de-DE" dirty="0"/>
               <a:t>Nun dürft ihr programmieren!</a:t>
             </a:r>
-            <a:endParaRPr lang="de-DE" dirty="0"/>
           </a:p>
         </p:txBody>
       </p:sp>
@@ -987,7 +986,7 @@
           </a:lstStyle>
           <a:p>
             <a:r>
-              <a:rPr lang="de-DE" smtClean="0"/>
+              <a:rPr lang="de-DE"/>
               <a:t>Titelmasterformat durch Klicken bearbeiten</a:t>
             </a:r>
             <a:endParaRPr lang="de-DE" dirty="0"/>
@@ -1104,7 +1103,7 @@
           </a:lstStyle>
           <a:p>
             <a:r>
-              <a:rPr lang="de-DE" smtClean="0"/>
+              <a:rPr lang="de-DE"/>
               <a:t>Formatvorlage des Untertitelmasters durch Klicken bearbeiten</a:t>
             </a:r>
             <a:endParaRPr lang="de-DE" dirty="0"/>
@@ -1178,7 +1177,7 @@
           <a:p>
             <a:pPr marL="0" lvl="0" indent="0"/>
             <a:r>
-              <a:rPr lang="de-DE" smtClean="0"/>
+              <a:rPr lang="de-DE"/>
               <a:t>Formatvorlagen des Textmasters bearbeiten</a:t>
             </a:r>
           </a:p>
@@ -1251,7 +1250,7 @@
           <a:p>
             <a:pPr marL="0" lvl="0" indent="0"/>
             <a:r>
-              <a:rPr lang="de-DE" smtClean="0"/>
+              <a:rPr lang="de-DE"/>
               <a:t>Formatvorlagen des Textmasters bearbeiten</a:t>
             </a:r>
           </a:p>
@@ -1462,7 +1461,7 @@
           </a:lstStyle>
           <a:p>
             <a:r>
-              <a:rPr lang="de-DE" smtClean="0"/>
+              <a:rPr lang="de-DE"/>
               <a:t>Titelmasterformat durch Klicken bearbeiten</a:t>
             </a:r>
             <a:endParaRPr lang="de-DE" dirty="0"/>
@@ -1576,7 +1575,7 @@
           <a:p>
             <a:pPr lvl="0"/>
             <a:r>
-              <a:rPr lang="de-DE" smtClean="0"/>
+              <a:rPr lang="de-DE"/>
               <a:t>Formatvorlagen des Textmasters bearbeiten</a:t>
             </a:r>
           </a:p>
@@ -1625,7 +1624,7 @@
           <a:p>
             <a:pPr lvl="0"/>
             <a:r>
-              <a:rPr lang="de-DE" smtClean="0"/>
+              <a:rPr lang="de-DE"/>
               <a:t>Formatvorlagen des Textmasters bearbeiten</a:t>
             </a:r>
           </a:p>
@@ -1745,14 +1744,14 @@
           <a:p>
             <a:pPr lvl="0"/>
             <a:r>
-              <a:rPr lang="de-DE" smtClean="0"/>
+              <a:rPr lang="de-DE"/>
               <a:t>Formatvorlagen des Textmasters bearbeiten</a:t>
             </a:r>
           </a:p>
           <a:p>
             <a:pPr lvl="1"/>
             <a:r>
-              <a:rPr lang="de-DE" smtClean="0"/>
+              <a:rPr lang="de-DE"/>
               <a:t>Zweite Ebene</a:t>
             </a:r>
           </a:p>
@@ -1815,7 +1814,7 @@
               <a:buNone/>
             </a:pPr>
             <a:r>
-              <a:rPr lang="de-DE" smtClean="0"/>
+              <a:rPr lang="de-DE"/>
               <a:t>Formatvorlagen des Textmasters bearbeiten</a:t>
             </a:r>
           </a:p>
@@ -2130,7 +2129,7 @@
           </a:lstStyle>
           <a:p>
             <a:r>
-              <a:rPr lang="de-DE" smtClean="0"/>
+              <a:rPr lang="de-DE"/>
               <a:t>Titelmasterformat durch Klicken bearbeiten</a:t>
             </a:r>
             <a:endParaRPr lang="de-DE" dirty="0"/>
@@ -2161,35 +2160,35 @@
           <a:p>
             <a:pPr lvl="0"/>
             <a:r>
-              <a:rPr lang="de-DE" smtClean="0"/>
+              <a:rPr lang="de-DE"/>
               <a:t>Formatvorlagen des Textmasters bearbeiten</a:t>
             </a:r>
           </a:p>
           <a:p>
             <a:pPr lvl="1"/>
             <a:r>
-              <a:rPr lang="de-DE" smtClean="0"/>
+              <a:rPr lang="de-DE"/>
               <a:t>Zweite Ebene</a:t>
             </a:r>
           </a:p>
           <a:p>
             <a:pPr lvl="2"/>
             <a:r>
-              <a:rPr lang="de-DE" smtClean="0"/>
+              <a:rPr lang="de-DE"/>
               <a:t>Dritte Ebene</a:t>
             </a:r>
           </a:p>
           <a:p>
             <a:pPr lvl="3"/>
             <a:r>
-              <a:rPr lang="de-DE" smtClean="0"/>
+              <a:rPr lang="de-DE"/>
               <a:t>Vierte Ebene</a:t>
             </a:r>
           </a:p>
           <a:p>
             <a:pPr lvl="4"/>
             <a:r>
-              <a:rPr lang="de-DE" smtClean="0"/>
+              <a:rPr lang="de-DE"/>
               <a:t>Fünfte Ebene</a:t>
             </a:r>
             <a:endParaRPr lang="de-DE" dirty="0"/>
@@ -2390,7 +2389,7 @@
           </a:lstStyle>
           <a:p>
             <a:r>
-              <a:rPr lang="de-DE" smtClean="0"/>
+              <a:rPr lang="de-DE"/>
               <a:t>Titelmasterformat durch Klicken bearbeiten</a:t>
             </a:r>
             <a:endParaRPr lang="de-DE" dirty="0"/>
@@ -2421,35 +2420,35 @@
           <a:p>
             <a:pPr lvl="0"/>
             <a:r>
-              <a:rPr lang="de-DE" smtClean="0"/>
+              <a:rPr lang="de-DE"/>
               <a:t>Formatvorlagen des Textmasters bearbeiten</a:t>
             </a:r>
           </a:p>
           <a:p>
             <a:pPr lvl="1"/>
             <a:r>
-              <a:rPr lang="de-DE" smtClean="0"/>
+              <a:rPr lang="de-DE"/>
               <a:t>Zweite Ebene</a:t>
             </a:r>
           </a:p>
           <a:p>
             <a:pPr lvl="2"/>
             <a:r>
-              <a:rPr lang="de-DE" smtClean="0"/>
+              <a:rPr lang="de-DE"/>
               <a:t>Dritte Ebene</a:t>
             </a:r>
           </a:p>
           <a:p>
             <a:pPr lvl="3"/>
             <a:r>
-              <a:rPr lang="de-DE" smtClean="0"/>
+              <a:rPr lang="de-DE"/>
               <a:t>Vierte Ebene</a:t>
             </a:r>
           </a:p>
           <a:p>
             <a:pPr lvl="4"/>
             <a:r>
-              <a:rPr lang="de-DE" smtClean="0"/>
+              <a:rPr lang="de-DE"/>
               <a:t>Fünfte Ebene</a:t>
             </a:r>
             <a:endParaRPr lang="de-DE" dirty="0"/>
@@ -2525,35 +2524,35 @@
           <a:p>
             <a:pPr lvl="0"/>
             <a:r>
-              <a:rPr lang="de-DE" smtClean="0"/>
+              <a:rPr lang="de-DE"/>
               <a:t>Formatvorlagen des Textmasters bearbeiten</a:t>
             </a:r>
           </a:p>
           <a:p>
             <a:pPr lvl="1"/>
             <a:r>
-              <a:rPr lang="de-DE" smtClean="0"/>
+              <a:rPr lang="de-DE"/>
               <a:t>Zweite Ebene</a:t>
             </a:r>
           </a:p>
           <a:p>
             <a:pPr lvl="2"/>
             <a:r>
-              <a:rPr lang="de-DE" smtClean="0"/>
+              <a:rPr lang="de-DE"/>
               <a:t>Dritte Ebene</a:t>
             </a:r>
           </a:p>
           <a:p>
             <a:pPr lvl="3"/>
             <a:r>
-              <a:rPr lang="de-DE" smtClean="0"/>
+              <a:rPr lang="de-DE"/>
               <a:t>Vierte Ebene</a:t>
             </a:r>
           </a:p>
           <a:p>
             <a:pPr lvl="4"/>
             <a:r>
-              <a:rPr lang="de-DE" smtClean="0"/>
+              <a:rPr lang="de-DE"/>
               <a:t>Fünfte Ebene</a:t>
             </a:r>
             <a:endParaRPr lang="de-DE" dirty="0"/>
@@ -2702,7 +2701,7 @@
           </a:lstStyle>
           <a:p>
             <a:r>
-              <a:rPr lang="de-DE" smtClean="0"/>
+              <a:rPr lang="de-DE"/>
               <a:t>Titelmasterformat durch Klicken bearbeiten</a:t>
             </a:r>
             <a:endParaRPr lang="de-DE" dirty="0"/>
@@ -2903,7 +2902,7 @@
           </a:lstStyle>
           <a:p>
             <a:r>
-              <a:rPr lang="de-DE" smtClean="0"/>
+              <a:rPr lang="de-DE"/>
               <a:t>Titelmasterformat durch Klicken bearbeiten</a:t>
             </a:r>
             <a:endParaRPr lang="de-DE" dirty="0"/>
@@ -2942,7 +2941,7 @@
               <a:defRPr/>
             </a:pPr>
             <a:r>
-              <a:rPr lang="de-DE" sz="1800" kern="1200" dirty="0" smtClean="0">
+              <a:rPr lang="de-DE" sz="1800" kern="1200" dirty="0">
                 <a:solidFill>
                   <a:schemeClr val="tx1"/>
                 </a:solidFill>
@@ -2952,14 +2951,6 @@
               </a:rPr>
               <a:t>Vorbereitungen</a:t>
             </a:r>
-            <a:endParaRPr lang="de-DE" sz="1800" kern="1200" dirty="0">
-              <a:solidFill>
-                <a:schemeClr val="tx1"/>
-              </a:solidFill>
-              <a:latin typeface="+mn-lt"/>
-              <a:ea typeface="+mn-ea"/>
-              <a:cs typeface="+mn-cs"/>
-            </a:endParaRPr>
           </a:p>
         </p:txBody>
       </p:sp>
@@ -2995,7 +2986,7 @@
               <a:defRPr/>
             </a:pPr>
             <a:r>
-              <a:rPr lang="de-DE" sz="1800" kern="1200" dirty="0" smtClean="0">
+              <a:rPr lang="de-DE" sz="1800" kern="1200" dirty="0">
                 <a:solidFill>
                   <a:schemeClr val="tx1"/>
                 </a:solidFill>
@@ -3005,14 +2996,6 @@
               </a:rPr>
               <a:t>Überblick</a:t>
             </a:r>
-            <a:endParaRPr lang="de-DE" sz="1800" kern="1200" dirty="0">
-              <a:solidFill>
-                <a:schemeClr val="tx1"/>
-              </a:solidFill>
-              <a:latin typeface="+mn-lt"/>
-              <a:ea typeface="+mn-ea"/>
-              <a:cs typeface="+mn-cs"/>
-            </a:endParaRPr>
           </a:p>
         </p:txBody>
       </p:sp>
@@ -3048,7 +3031,7 @@
               <a:defRPr/>
             </a:pPr>
             <a:r>
-              <a:rPr lang="de-DE" sz="1800" kern="1200" dirty="0" smtClean="0">
+              <a:rPr lang="de-DE" sz="1800" kern="1200" dirty="0">
                 <a:solidFill>
                   <a:schemeClr val="tx1"/>
                 </a:solidFill>
@@ -3058,14 +3041,6 @@
               </a:rPr>
               <a:t>Durchführung</a:t>
             </a:r>
-            <a:endParaRPr lang="de-DE" sz="1800" kern="1200" dirty="0">
-              <a:solidFill>
-                <a:schemeClr val="tx1"/>
-              </a:solidFill>
-              <a:latin typeface="+mn-lt"/>
-              <a:ea typeface="+mn-ea"/>
-              <a:cs typeface="+mn-cs"/>
-            </a:endParaRPr>
           </a:p>
         </p:txBody>
       </p:sp>
@@ -3305,13 +3280,6 @@
       </p:transition>
     </mc:Fallback>
   </mc:AlternateContent>
-  <p:timing>
-    <p:tnLst>
-      <p:par>
-        <p:cTn id="1" dur="indefinite" restart="never" nodeType="tmRoot"/>
-      </p:par>
-    </p:tnLst>
-  </p:timing>
 </p:sldLayout>
 </file>
 
@@ -3402,7 +3370,7 @@
           </a:lstStyle>
           <a:p>
             <a:r>
-              <a:rPr lang="de-DE" smtClean="0"/>
+              <a:rPr lang="de-DE"/>
               <a:t>Titelmasterformat durch Klicken bearbeiten</a:t>
             </a:r>
             <a:endParaRPr lang="de-DE" dirty="0"/>
@@ -7670,13 +7638,6 @@
       </p:transition>
     </mc:Fallback>
   </mc:AlternateContent>
-  <p:timing>
-    <p:tnLst>
-      <p:par>
-        <p:cTn id="1" dur="indefinite" restart="never" nodeType="tmRoot"/>
-      </p:par>
-    </p:tnLst>
-  </p:timing>
 </p:sldLayout>
 </file>
 
@@ -7721,10 +7682,9 @@
           </a:lstStyle>
           <a:p>
             <a:r>
-              <a:rPr lang="de-DE" smtClean="0"/>
+              <a:rPr lang="de-DE"/>
               <a:t>Titelmasterformat durch Klicken bearbeiten</a:t>
             </a:r>
-            <a:endParaRPr lang="de-DE"/>
           </a:p>
         </p:txBody>
       </p:sp>
@@ -7903,38 +7863,37 @@
           <a:p>
             <a:pPr lvl="0"/>
             <a:r>
-              <a:rPr lang="de-DE" smtClean="0"/>
+              <a:rPr lang="de-DE"/>
               <a:t>Formatvorlagen des Textmasters bearbeiten</a:t>
             </a:r>
           </a:p>
           <a:p>
             <a:pPr lvl="1"/>
             <a:r>
-              <a:rPr lang="de-DE" smtClean="0"/>
+              <a:rPr lang="de-DE"/>
               <a:t>Zweite Ebene</a:t>
             </a:r>
           </a:p>
           <a:p>
             <a:pPr lvl="2"/>
             <a:r>
-              <a:rPr lang="de-DE" smtClean="0"/>
+              <a:rPr lang="de-DE"/>
               <a:t>Dritte Ebene</a:t>
             </a:r>
           </a:p>
           <a:p>
             <a:pPr lvl="3"/>
             <a:r>
-              <a:rPr lang="de-DE" smtClean="0"/>
+              <a:rPr lang="de-DE"/>
               <a:t>Vierte Ebene</a:t>
             </a:r>
           </a:p>
           <a:p>
             <a:pPr lvl="4"/>
             <a:r>
-              <a:rPr lang="de-DE" smtClean="0"/>
+              <a:rPr lang="de-DE"/>
               <a:t>Fünfte Ebene</a:t>
             </a:r>
-            <a:endParaRPr lang="de-DE"/>
           </a:p>
         </p:txBody>
       </p:sp>
@@ -7998,38 +7957,37 @@
           <a:p>
             <a:pPr lvl="0"/>
             <a:r>
-              <a:rPr lang="de-DE" smtClean="0"/>
+              <a:rPr lang="de-DE"/>
               <a:t>Formatvorlagen des Textmasters bearbeiten</a:t>
             </a:r>
           </a:p>
           <a:p>
             <a:pPr lvl="1"/>
             <a:r>
-              <a:rPr lang="de-DE" smtClean="0"/>
+              <a:rPr lang="de-DE"/>
               <a:t>Zweite Ebene</a:t>
             </a:r>
           </a:p>
           <a:p>
             <a:pPr lvl="2"/>
             <a:r>
-              <a:rPr lang="de-DE" smtClean="0"/>
+              <a:rPr lang="de-DE"/>
               <a:t>Dritte Ebene</a:t>
             </a:r>
           </a:p>
           <a:p>
             <a:pPr lvl="3"/>
             <a:r>
-              <a:rPr lang="de-DE" smtClean="0"/>
+              <a:rPr lang="de-DE"/>
               <a:t>Vierte Ebene</a:t>
             </a:r>
           </a:p>
           <a:p>
             <a:pPr lvl="4"/>
             <a:r>
-              <a:rPr lang="de-DE" smtClean="0"/>
+              <a:rPr lang="de-DE"/>
               <a:t>Fünfte Ebene</a:t>
             </a:r>
-            <a:endParaRPr lang="de-DE"/>
           </a:p>
         </p:txBody>
       </p:sp>
@@ -8086,7 +8044,7 @@
               </a:spcAft>
             </a:pPr>
             <a:r>
-              <a:rPr lang="de-DE" smtClean="0"/>
+              <a:rPr lang="de-DE"/>
               <a:t>Formatvorlagen des Textmasters bearbeiten</a:t>
             </a:r>
           </a:p>
@@ -8145,7 +8103,7 @@
               </a:spcAft>
             </a:pPr>
             <a:r>
-              <a:rPr lang="de-DE" smtClean="0"/>
+              <a:rPr lang="de-DE"/>
               <a:t>Formatvorlagen des Textmasters bearbeiten</a:t>
             </a:r>
           </a:p>
@@ -8249,13 +8207,6 @@
       </p:transition>
     </mc:Fallback>
   </mc:AlternateContent>
-  <p:timing>
-    <p:tnLst>
-      <p:par>
-        <p:cTn id="1" dur="indefinite" restart="never" nodeType="tmRoot"/>
-      </p:par>
-    </p:tnLst>
-  </p:timing>
 </p:sldLayout>
 </file>
 
@@ -8300,10 +8251,9 @@
           </a:lstStyle>
           <a:p>
             <a:r>
-              <a:rPr lang="de-DE" smtClean="0"/>
+              <a:rPr lang="de-DE"/>
               <a:t>Titelmasterformat durch Klicken bearbeiten</a:t>
             </a:r>
-            <a:endParaRPr lang="de-DE"/>
           </a:p>
         </p:txBody>
       </p:sp>
@@ -8447,38 +8397,37 @@
           <a:p>
             <a:pPr lvl="0"/>
             <a:r>
-              <a:rPr lang="de-DE" smtClean="0"/>
+              <a:rPr lang="de-DE"/>
               <a:t>Formatvorlagen des Textmasters bearbeiten</a:t>
             </a:r>
           </a:p>
           <a:p>
             <a:pPr lvl="1"/>
             <a:r>
-              <a:rPr lang="de-DE" smtClean="0"/>
+              <a:rPr lang="de-DE"/>
               <a:t>Zweite Ebene</a:t>
             </a:r>
           </a:p>
           <a:p>
             <a:pPr lvl="2"/>
             <a:r>
-              <a:rPr lang="de-DE" smtClean="0"/>
+              <a:rPr lang="de-DE"/>
               <a:t>Dritte Ebene</a:t>
             </a:r>
           </a:p>
           <a:p>
             <a:pPr lvl="3"/>
             <a:r>
-              <a:rPr lang="de-DE" smtClean="0"/>
+              <a:rPr lang="de-DE"/>
               <a:t>Vierte Ebene</a:t>
             </a:r>
           </a:p>
           <a:p>
             <a:pPr lvl="4"/>
             <a:r>
-              <a:rPr lang="de-DE" smtClean="0"/>
+              <a:rPr lang="de-DE"/>
               <a:t>Fünfte Ebene</a:t>
             </a:r>
-            <a:endParaRPr lang="de-DE"/>
           </a:p>
         </p:txBody>
       </p:sp>
@@ -8535,7 +8484,7 @@
               </a:spcAft>
             </a:pPr>
             <a:r>
-              <a:rPr lang="de-DE" smtClean="0"/>
+              <a:rPr lang="de-DE"/>
               <a:t>Formatvorlagen des Textmasters bearbeiten</a:t>
             </a:r>
           </a:p>
@@ -8701,13 +8650,6 @@
       </p:transition>
     </mc:Fallback>
   </mc:AlternateContent>
-  <p:timing>
-    <p:tnLst>
-      <p:par>
-        <p:cTn id="1" dur="indefinite" restart="never" nodeType="tmRoot"/>
-      </p:par>
-    </p:tnLst>
-  </p:timing>
 </p:sldLayout>
 </file>
 
@@ -8752,10 +8694,9 @@
           </a:lstStyle>
           <a:p>
             <a:r>
-              <a:rPr lang="de-DE" smtClean="0"/>
+              <a:rPr lang="de-DE"/>
               <a:t>Titelmasterformat durch Klicken bearbeiten</a:t>
             </a:r>
-            <a:endParaRPr lang="de-DE"/>
           </a:p>
         </p:txBody>
       </p:sp>
@@ -8899,38 +8840,37 @@
           <a:p>
             <a:pPr lvl="0"/>
             <a:r>
-              <a:rPr lang="de-DE" smtClean="0"/>
+              <a:rPr lang="de-DE"/>
               <a:t>Formatvorlagen des Textmasters bearbeiten</a:t>
             </a:r>
           </a:p>
           <a:p>
             <a:pPr lvl="1"/>
             <a:r>
-              <a:rPr lang="de-DE" smtClean="0"/>
+              <a:rPr lang="de-DE"/>
               <a:t>Zweite Ebene</a:t>
             </a:r>
           </a:p>
           <a:p>
             <a:pPr lvl="2"/>
             <a:r>
-              <a:rPr lang="de-DE" smtClean="0"/>
+              <a:rPr lang="de-DE"/>
               <a:t>Dritte Ebene</a:t>
             </a:r>
           </a:p>
           <a:p>
             <a:pPr lvl="3"/>
             <a:r>
-              <a:rPr lang="de-DE" smtClean="0"/>
+              <a:rPr lang="de-DE"/>
               <a:t>Vierte Ebene</a:t>
             </a:r>
           </a:p>
           <a:p>
             <a:pPr lvl="4"/>
             <a:r>
-              <a:rPr lang="de-DE" smtClean="0"/>
+              <a:rPr lang="de-DE"/>
               <a:t>Fünfte Ebene</a:t>
             </a:r>
-            <a:endParaRPr lang="de-DE"/>
           </a:p>
         </p:txBody>
       </p:sp>
@@ -8987,7 +8927,7 @@
               </a:spcAft>
             </a:pPr>
             <a:r>
-              <a:rPr lang="de-DE" smtClean="0"/>
+              <a:rPr lang="de-DE"/>
               <a:t>Formatvorlagen des Textmasters bearbeiten</a:t>
             </a:r>
           </a:p>
@@ -13884,10 +13824,9 @@
           <a:lstStyle/>
           <a:p>
             <a:r>
-              <a:rPr lang="de-DE" dirty="0" smtClean="0"/>
+              <a:rPr lang="de-DE" dirty="0"/>
               <a:t>ACTICO Code Challenge</a:t>
             </a:r>
-            <a:endParaRPr lang="de-DE" dirty="0"/>
           </a:p>
         </p:txBody>
       </p:sp>
@@ -13907,34 +13846,25 @@
           <a:lstStyle/>
           <a:p>
             <a:r>
-              <a:rPr lang="de-DE" dirty="0" smtClean="0"/>
+              <a:rPr lang="de-DE" dirty="0"/>
               <a:t>King-</a:t>
             </a:r>
             <a:r>
-              <a:rPr lang="de-DE" dirty="0" err="1" smtClean="0"/>
+              <a:rPr lang="de-DE" dirty="0" err="1"/>
               <a:t>of</a:t>
             </a:r>
             <a:r>
-              <a:rPr lang="de-DE" dirty="0" smtClean="0"/>
+              <a:rPr lang="de-DE" dirty="0"/>
               <a:t>-</a:t>
             </a:r>
             <a:r>
-              <a:rPr lang="de-DE" dirty="0" err="1" smtClean="0"/>
+              <a:rPr lang="de-DE" dirty="0" err="1"/>
               <a:t>the</a:t>
             </a:r>
             <a:r>
-              <a:rPr lang="de-DE" dirty="0" smtClean="0"/>
-              <a:t>-Hill</a:t>
-            </a:r>
-            <a:r>
               <a:rPr lang="de-DE" dirty="0"/>
-              <a:t>: </a:t>
-            </a:r>
-            <a:r>
-              <a:rPr lang="de-DE" dirty="0" smtClean="0"/>
-              <a:t>Überlebender Wolf</a:t>
-            </a:r>
-            <a:endParaRPr lang="de-DE" dirty="0"/>
+              <a:t>-Hill: Überlebender Wolf</a:t>
+            </a:r>
           </a:p>
         </p:txBody>
       </p:sp>
@@ -14113,25 +14043,8 @@
               </a:rPr>
               <a:t>Treffen Sie bessere operative Entscheidungen </a:t>
             </a:r>
-            <a:endParaRPr lang="de-DE" sz="1600" b="0" dirty="0" smtClean="0">
-              <a:solidFill>
-                <a:schemeClr val="bg1"/>
-              </a:solidFill>
-              <a:latin typeface="Fira Sans" panose="020B0503050000020004" pitchFamily="34" charset="0"/>
-              <a:ea typeface="Fira Sans" panose="020B0503050000020004" pitchFamily="34" charset="0"/>
-            </a:endParaRPr>
-          </a:p>
-          <a:p>
-            <a:r>
-              <a:rPr lang="de-DE" sz="1600" b="0" dirty="0" smtClean="0">
-                <a:solidFill>
-                  <a:schemeClr val="bg1"/>
-                </a:solidFill>
-                <a:latin typeface="Fira Sans" panose="020B0503050000020004" pitchFamily="34" charset="0"/>
-                <a:ea typeface="Fira Sans" panose="020B0503050000020004" pitchFamily="34" charset="0"/>
-              </a:rPr>
-              <a:t>in </a:t>
-            </a:r>
+          </a:p>
+          <a:p>
             <a:r>
               <a:rPr lang="de-DE" sz="1600" b="0" dirty="0">
                 <a:solidFill>
@@ -14140,7 +14053,7 @@
                 <a:latin typeface="Fira Sans" panose="020B0503050000020004" pitchFamily="34" charset="0"/>
                 <a:ea typeface="Fira Sans" panose="020B0503050000020004" pitchFamily="34" charset="0"/>
               </a:rPr>
-              <a:t>der digitalen Welt.</a:t>
+              <a:t>in der digitalen Welt.</a:t>
             </a:r>
           </a:p>
         </p:txBody>
@@ -14163,13 +14076,6 @@
       <p:transition/>
     </mc:Fallback>
   </mc:AlternateContent>
-  <p:timing>
-    <p:tnLst>
-      <p:par>
-        <p:cTn id="1" dur="indefinite" restart="never" nodeType="tmRoot"/>
-      </p:par>
-    </p:tnLst>
-  </p:timing>
 </p:sld>
 </file>
 
@@ -14206,10 +14112,9 @@
           <a:lstStyle/>
           <a:p>
             <a:r>
-              <a:rPr lang="de-DE" dirty="0" smtClean="0"/>
+              <a:rPr lang="de-DE" dirty="0"/>
               <a:t>Durchführung I</a:t>
             </a:r>
-            <a:endParaRPr lang="de-DE" dirty="0"/>
           </a:p>
         </p:txBody>
       </p:sp>
@@ -14234,132 +14139,157 @@
           <a:lstStyle/>
           <a:p>
             <a:r>
-              <a:rPr lang="de-DE" dirty="0" smtClean="0"/>
+              <a:rPr lang="de-DE" dirty="0"/>
               <a:t>Teambildung:</a:t>
             </a:r>
           </a:p>
           <a:p>
             <a:pPr lvl="1"/>
             <a:r>
-              <a:rPr lang="de-DE" dirty="0" smtClean="0"/>
+              <a:rPr lang="de-DE" dirty="0"/>
               <a:t>Je 1 erfahrener Programmierer und 2 Einsteiger</a:t>
             </a:r>
           </a:p>
           <a:p>
             <a:pPr lvl="1"/>
             <a:r>
-              <a:rPr lang="de-DE" dirty="0" smtClean="0"/>
+              <a:rPr lang="de-DE" dirty="0"/>
               <a:t>Denkt euch einen Namen für eure Wolf-Rasse aus</a:t>
             </a:r>
           </a:p>
           <a:p>
             <a:pPr lvl="1"/>
-            <a:endParaRPr lang="de-DE" dirty="0" smtClean="0"/>
-          </a:p>
-          <a:p>
-            <a:r>
-              <a:rPr lang="de-DE" dirty="0" smtClean="0"/>
+            <a:endParaRPr lang="de-DE" dirty="0"/>
+          </a:p>
+          <a:p>
+            <a:r>
+              <a:rPr lang="de-DE" dirty="0"/>
               <a:t>Öffnet die Kommandozeile im Verzeichnis des Projekts</a:t>
             </a:r>
           </a:p>
           <a:p>
             <a:pPr lvl="1"/>
             <a:r>
-              <a:rPr lang="de-DE" b="1" dirty="0" err="1" smtClean="0">
+              <a:rPr lang="de-DE" b="1" dirty="0" err="1">
                 <a:latin typeface="Consolas" panose="020B0609020204030204" pitchFamily="49" charset="0"/>
               </a:rPr>
               <a:t>git</a:t>
             </a:r>
             <a:r>
-              <a:rPr lang="de-DE" b="1" dirty="0" smtClean="0">
+              <a:rPr lang="de-DE" b="1" dirty="0">
                 <a:latin typeface="Consolas" panose="020B0609020204030204" pitchFamily="49" charset="0"/>
               </a:rPr>
               <a:t> </a:t>
             </a:r>
             <a:r>
-              <a:rPr lang="de-DE" b="1" dirty="0" err="1" smtClean="0">
+              <a:rPr lang="de-DE" b="1" dirty="0" err="1">
                 <a:latin typeface="Consolas" panose="020B0609020204030204" pitchFamily="49" charset="0"/>
               </a:rPr>
-              <a:t>chec</a:t>
-            </a:r>
-            <a:r>
-              <a:rPr lang="de-DE" b="1" dirty="0" err="1" smtClean="0">
+              <a:t>checckout</a:t>
+            </a:r>
+            <a:r>
+              <a:rPr lang="de-DE" b="1" dirty="0">
                 <a:latin typeface="Consolas" panose="020B0609020204030204" pitchFamily="49" charset="0"/>
               </a:rPr>
-              <a:t>ckout</a:t>
-            </a:r>
-            <a:r>
-              <a:rPr lang="de-DE" b="1" smtClean="0">
+              <a:t> -b [Rassenname]</a:t>
+            </a:r>
+          </a:p>
+          <a:p>
+            <a:pPr lvl="1"/>
+            <a:endParaRPr lang="de-DE" dirty="0"/>
+          </a:p>
+          <a:p>
+            <a:r>
+              <a:rPr lang="de-DE" dirty="0"/>
+              <a:t>Öffne </a:t>
+            </a:r>
+            <a:r>
+              <a:rPr lang="de-DE" dirty="0" err="1"/>
+              <a:t>IntelliJ</a:t>
+            </a:r>
+            <a:r>
+              <a:rPr lang="de-DE" dirty="0"/>
+              <a:t>, importiere den </a:t>
+            </a:r>
+            <a:r>
+              <a:rPr lang="de-DE" b="1" dirty="0" err="1">
                 <a:latin typeface="Consolas" panose="020B0609020204030204" pitchFamily="49" charset="0"/>
               </a:rPr>
-              <a:t> -b</a:t>
-            </a:r>
-            <a:r>
-              <a:rPr lang="de-DE" b="1" smtClean="0">
-                <a:latin typeface="Consolas" panose="020B0609020204030204" pitchFamily="49" charset="0"/>
-              </a:rPr>
-              <a:t> </a:t>
-            </a:r>
-            <a:r>
-              <a:rPr lang="de-DE" b="1" dirty="0" smtClean="0">
-                <a:latin typeface="Consolas" panose="020B0609020204030204" pitchFamily="49" charset="0"/>
-              </a:rPr>
-              <a:t>[Rassenname]</a:t>
+              <a:t>java</a:t>
+            </a:r>
+            <a:r>
+              <a:rPr lang="de-DE" dirty="0"/>
+              <a:t> Ordner als </a:t>
+            </a:r>
+            <a:r>
+              <a:rPr lang="de-DE"/>
+              <a:t>neues Projekt</a:t>
+            </a:r>
+            <a:endParaRPr lang="de-DE" dirty="0"/>
+          </a:p>
+          <a:p>
+            <a:endParaRPr lang="de-DE" dirty="0"/>
+          </a:p>
+          <a:p>
+            <a:r>
+              <a:rPr lang="de-DE" dirty="0"/>
+              <a:t>Erzeugt euch eine Kopie von ./</a:t>
+            </a:r>
+            <a:r>
+              <a:rPr lang="de-DE" dirty="0" err="1"/>
+              <a:t>java</a:t>
+            </a:r>
+            <a:r>
+              <a:rPr lang="de-DE" dirty="0"/>
+              <a:t>/</a:t>
+            </a:r>
+            <a:r>
+              <a:rPr lang="de-DE" dirty="0" err="1"/>
+              <a:t>src</a:t>
+            </a:r>
+            <a:r>
+              <a:rPr lang="de-DE" dirty="0"/>
+              <a:t>/</a:t>
+            </a:r>
+            <a:r>
+              <a:rPr lang="de-DE" dirty="0" err="1"/>
+              <a:t>animals</a:t>
+            </a:r>
+            <a:r>
+              <a:rPr lang="de-DE" dirty="0"/>
+              <a:t>/DefaultWolf.java</a:t>
             </a:r>
           </a:p>
           <a:p>
             <a:pPr lvl="1"/>
-            <a:endParaRPr lang="de-DE" dirty="0" smtClean="0"/>
-          </a:p>
-          <a:p>
-            <a:r>
-              <a:rPr lang="de-DE" dirty="0" smtClean="0"/>
-              <a:t>Öffnet das Projekt in </a:t>
-            </a:r>
-            <a:r>
-              <a:rPr lang="de-DE" dirty="0" err="1" smtClean="0"/>
-              <a:t>IntelliJ</a:t>
-            </a:r>
-            <a:endParaRPr lang="de-DE" dirty="0" smtClean="0"/>
+            <a:r>
+              <a:rPr lang="de-DE" dirty="0"/>
+              <a:t>Diese Kopie dürft ihr bearbeiten!</a:t>
+            </a:r>
           </a:p>
           <a:p>
             <a:endParaRPr lang="de-DE" dirty="0"/>
           </a:p>
           <a:p>
             <a:r>
-              <a:rPr lang="de-DE" dirty="0" smtClean="0"/>
-              <a:t>Erzeugt euch eine Kopie von ./</a:t>
-            </a:r>
-            <a:r>
-              <a:rPr lang="de-DE" dirty="0" err="1" smtClean="0"/>
+              <a:rPr lang="de-DE" dirty="0"/>
+              <a:t>In der Datei /.</a:t>
+            </a:r>
+            <a:r>
+              <a:rPr lang="de-DE" dirty="0" err="1"/>
               <a:t>java</a:t>
             </a:r>
             <a:r>
-              <a:rPr lang="de-DE" dirty="0" smtClean="0"/>
+              <a:rPr lang="de-DE" dirty="0"/>
               <a:t>/</a:t>
             </a:r>
             <a:r>
-              <a:rPr lang="de-DE" dirty="0" err="1" smtClean="0"/>
+              <a:rPr lang="de-DE" dirty="0" err="1"/>
               <a:t>src</a:t>
             </a:r>
             <a:r>
-              <a:rPr lang="de-DE" dirty="0" smtClean="0"/>
-              <a:t>/</a:t>
-            </a:r>
-            <a:r>
-              <a:rPr lang="de-DE" dirty="0" err="1" smtClean="0"/>
-              <a:t>animals</a:t>
-            </a:r>
-            <a:r>
-              <a:rPr lang="de-DE" dirty="0" smtClean="0"/>
-              <a:t>/DefaultWolf.java</a:t>
-            </a:r>
-          </a:p>
-          <a:p>
-            <a:pPr lvl="1"/>
-            <a:r>
-              <a:rPr lang="de-DE" dirty="0" smtClean="0"/>
-              <a:t>Diese Kopie dürft ihr bearbeiten!</a:t>
+              <a:rPr lang="de-DE" dirty="0"/>
+              <a:t>/wild/Wild.java, fügt euren Wolf hinzu</a:t>
             </a:r>
           </a:p>
           <a:p>
@@ -14367,32 +14297,7 @@
           </a:p>
           <a:p>
             <a:r>
-              <a:rPr lang="de-DE" dirty="0" smtClean="0"/>
-              <a:t>In der Datei /.</a:t>
-            </a:r>
-            <a:r>
-              <a:rPr lang="de-DE" dirty="0" err="1" smtClean="0"/>
-              <a:t>java</a:t>
-            </a:r>
-            <a:r>
-              <a:rPr lang="de-DE" dirty="0" smtClean="0"/>
-              <a:t>/</a:t>
-            </a:r>
-            <a:r>
-              <a:rPr lang="de-DE" dirty="0" err="1" smtClean="0"/>
-              <a:t>src</a:t>
-            </a:r>
-            <a:r>
-              <a:rPr lang="de-DE" dirty="0" smtClean="0"/>
-              <a:t>/wild/Wild.java, fügt euren Wolf hinzu</a:t>
-            </a:r>
-          </a:p>
-          <a:p>
-            <a:endParaRPr lang="de-DE" dirty="0"/>
-          </a:p>
-          <a:p>
-            <a:r>
-              <a:rPr lang="de-DE" dirty="0" smtClean="0"/>
+              <a:rPr lang="de-DE" dirty="0"/>
               <a:t>Testet das Programm, durch Klick auf den grünen Pfeil</a:t>
             </a:r>
           </a:p>
@@ -14441,13 +14346,6 @@
       <p:transition/>
     </mc:Fallback>
   </mc:AlternateContent>
-  <p:timing>
-    <p:tnLst>
-      <p:par>
-        <p:cTn id="1" dur="indefinite" restart="never" nodeType="tmRoot"/>
-      </p:par>
-    </p:tnLst>
-  </p:timing>
 </p:sld>
 </file>
 
@@ -14484,10 +14382,9 @@
           <a:lstStyle/>
           <a:p>
             <a:r>
-              <a:rPr lang="de-DE" dirty="0" smtClean="0"/>
+              <a:rPr lang="de-DE" dirty="0"/>
               <a:t>Durchführung II</a:t>
             </a:r>
-            <a:endParaRPr lang="de-DE" dirty="0"/>
           </a:p>
         </p:txBody>
       </p:sp>
@@ -14598,7 +14495,7 @@
           <a:p>
             <a:pPr algn="ctr"/>
             <a:r>
-              <a:rPr lang="de-DE" sz="1400" dirty="0" smtClean="0">
+              <a:rPr lang="de-DE" sz="1400" dirty="0">
                 <a:solidFill>
                   <a:schemeClr val="tx1"/>
                 </a:solidFill>
@@ -14686,7 +14583,7 @@
           <a:p>
             <a:pPr algn="ctr"/>
             <a:r>
-              <a:rPr lang="de-DE" sz="1400" dirty="0" smtClean="0">
+              <a:rPr lang="de-DE" sz="1400" dirty="0">
                 <a:solidFill>
                   <a:schemeClr val="tx1"/>
                 </a:solidFill>
@@ -14694,7 +14591,7 @@
               <a:t>Wird aufgerufen, wenn ihr kämpft. Parameter „c“ ist der Typ eures Gegners. Ihr müsst ein </a:t>
             </a:r>
             <a:r>
-              <a:rPr lang="de-DE" sz="1400" dirty="0" err="1" smtClean="0">
+              <a:rPr lang="de-DE" sz="1400" dirty="0" err="1">
                 <a:solidFill>
                   <a:schemeClr val="tx1"/>
                 </a:solidFill>
@@ -14702,7 +14599,7 @@
               <a:t>Attack-Enum</a:t>
             </a:r>
             <a:r>
-              <a:rPr lang="de-DE" sz="1400" dirty="0" smtClean="0">
+              <a:rPr lang="de-DE" sz="1400" dirty="0">
                 <a:solidFill>
                   <a:schemeClr val="tx1"/>
                 </a:solidFill>
@@ -14757,7 +14654,7 @@
           <a:p>
             <a:pPr algn="ctr"/>
             <a:r>
-              <a:rPr lang="de-DE" sz="1400" dirty="0" smtClean="0">
+              <a:rPr lang="de-DE" sz="1400" dirty="0">
                 <a:solidFill>
                   <a:schemeClr val="tx1"/>
                 </a:solidFill>
@@ -14765,7 +14662,7 @@
               <a:t>Wird aufgerufen, wenn ihr euch bewegen dürft. Ihr habt Zugriff auf das „</a:t>
             </a:r>
             <a:r>
-              <a:rPr lang="de-DE" sz="1400" dirty="0" err="1" smtClean="0">
+              <a:rPr lang="de-DE" sz="1400" dirty="0" err="1">
                 <a:solidFill>
                   <a:schemeClr val="tx1"/>
                 </a:solidFill>
@@ -14773,7 +14670,7 @@
               <a:t>surroundings</a:t>
             </a:r>
             <a:r>
-              <a:rPr lang="de-DE" sz="1400" dirty="0" smtClean="0">
+              <a:rPr lang="de-DE" sz="1400" dirty="0">
                 <a:solidFill>
                   <a:schemeClr val="tx1"/>
                 </a:solidFill>
@@ -14781,7 +14678,7 @@
               <a:t>“ Array! Ihr müsst ein Move-</a:t>
             </a:r>
             <a:r>
-              <a:rPr lang="de-DE" sz="1400" dirty="0" err="1" smtClean="0">
+              <a:rPr lang="de-DE" sz="1400" dirty="0" err="1">
                 <a:solidFill>
                   <a:schemeClr val="tx1"/>
                 </a:solidFill>
@@ -14789,7 +14686,7 @@
               <a:t>Enum</a:t>
             </a:r>
             <a:r>
-              <a:rPr lang="de-DE" sz="1400" dirty="0" smtClean="0">
+              <a:rPr lang="de-DE" sz="1400" dirty="0">
                 <a:solidFill>
                   <a:schemeClr val="tx1"/>
                 </a:solidFill>
@@ -14887,13 +14784,6 @@
       <p:transition/>
     </mc:Fallback>
   </mc:AlternateContent>
-  <p:timing>
-    <p:tnLst>
-      <p:par>
-        <p:cTn id="1" dur="indefinite" restart="never" nodeType="tmRoot"/>
-      </p:par>
-    </p:tnLst>
-  </p:timing>
 </p:sld>
 </file>
 
@@ -14930,10 +14820,9 @@
           <a:lstStyle/>
           <a:p>
             <a:r>
-              <a:rPr lang="de-DE" dirty="0" smtClean="0"/>
+              <a:rPr lang="de-DE" dirty="0"/>
               <a:t>Abschluss</a:t>
             </a:r>
-            <a:endParaRPr lang="de-DE" dirty="0"/>
           </a:p>
         </p:txBody>
       </p:sp>
@@ -14958,7 +14847,7 @@
           <a:lstStyle/>
           <a:p>
             <a:r>
-              <a:rPr lang="de-DE" dirty="0" smtClean="0"/>
+              <a:rPr lang="de-DE" dirty="0"/>
               <a:t>Stellt sicher, dass das Programm noch funktioniert</a:t>
             </a:r>
           </a:p>
@@ -14967,68 +14856,68 @@
           </a:p>
           <a:p>
             <a:r>
-              <a:rPr lang="de-DE" dirty="0" smtClean="0"/>
+              <a:rPr lang="de-DE" dirty="0"/>
               <a:t>Öffnet wieder die Kommandokonsole</a:t>
             </a:r>
           </a:p>
           <a:p>
             <a:pPr lvl="1"/>
             <a:r>
-              <a:rPr lang="de-DE" dirty="0" err="1" smtClean="0">
+              <a:rPr lang="de-DE" dirty="0" err="1">
                 <a:latin typeface="Consolas" panose="020B0609020204030204" pitchFamily="49" charset="0"/>
               </a:rPr>
               <a:t>git</a:t>
             </a:r>
             <a:r>
-              <a:rPr lang="de-DE" dirty="0" smtClean="0">
+              <a:rPr lang="de-DE" dirty="0">
                 <a:latin typeface="Consolas" panose="020B0609020204030204" pitchFamily="49" charset="0"/>
               </a:rPr>
               <a:t> </a:t>
             </a:r>
             <a:r>
-              <a:rPr lang="de-DE" dirty="0" err="1" smtClean="0">
+              <a:rPr lang="de-DE" dirty="0" err="1">
                 <a:latin typeface="Consolas" panose="020B0609020204030204" pitchFamily="49" charset="0"/>
               </a:rPr>
               <a:t>commit</a:t>
             </a:r>
             <a:r>
-              <a:rPr lang="de-DE" dirty="0" smtClean="0">
+              <a:rPr lang="de-DE" dirty="0">
                 <a:latin typeface="Consolas" panose="020B0609020204030204" pitchFamily="49" charset="0"/>
               </a:rPr>
               <a:t> –a –m "Add </a:t>
             </a:r>
             <a:r>
-              <a:rPr lang="de-DE" dirty="0" err="1" smtClean="0">
+              <a:rPr lang="de-DE" dirty="0" err="1">
                 <a:latin typeface="Consolas" panose="020B0609020204030204" pitchFamily="49" charset="0"/>
               </a:rPr>
               <a:t>new</a:t>
             </a:r>
             <a:r>
-              <a:rPr lang="de-DE" dirty="0" smtClean="0">
+              <a:rPr lang="de-DE" dirty="0">
                 <a:latin typeface="Consolas" panose="020B0609020204030204" pitchFamily="49" charset="0"/>
               </a:rPr>
               <a:t> </a:t>
             </a:r>
             <a:r>
-              <a:rPr lang="de-DE" dirty="0" err="1" smtClean="0">
+              <a:rPr lang="de-DE" dirty="0" err="1">
                 <a:latin typeface="Consolas" panose="020B0609020204030204" pitchFamily="49" charset="0"/>
               </a:rPr>
               <a:t>wolf</a:t>
             </a:r>
             <a:r>
-              <a:rPr lang="de-DE" dirty="0" smtClean="0">
+              <a:rPr lang="de-DE" dirty="0">
                 <a:latin typeface="Consolas" panose="020B0609020204030204" pitchFamily="49" charset="0"/>
               </a:rPr>
               <a:t>: [Euer </a:t>
             </a:r>
             <a:r>
-              <a:rPr lang="de-DE" dirty="0" err="1" smtClean="0">
+              <a:rPr lang="de-DE" dirty="0" err="1">
                 <a:latin typeface="Consolas" panose="020B0609020204030204" pitchFamily="49" charset="0"/>
               </a:rPr>
               <a:t>Wolfname</a:t>
             </a:r>
             <a:r>
-              <a:rPr lang="de-DE" dirty="0" smtClean="0">
+              <a:rPr lang="de-DE" dirty="0">
                 <a:latin typeface="Consolas" panose="020B0609020204030204" pitchFamily="49" charset="0"/>
               </a:rPr>
               <a:t>]"</a:t>
@@ -15037,13 +14926,13 @@
           <a:p>
             <a:pPr lvl="1"/>
             <a:r>
-              <a:rPr lang="de-DE" dirty="0" err="1" smtClean="0">
+              <a:rPr lang="de-DE" dirty="0" err="1">
                 <a:latin typeface="Consolas" panose="020B0609020204030204" pitchFamily="49" charset="0"/>
               </a:rPr>
               <a:t>git</a:t>
             </a:r>
             <a:r>
-              <a:rPr lang="de-DE" dirty="0" smtClean="0">
+              <a:rPr lang="de-DE" dirty="0">
                 <a:latin typeface="Consolas" panose="020B0609020204030204" pitchFamily="49" charset="0"/>
               </a:rPr>
               <a:t> push</a:t>
@@ -15051,14 +14940,13 @@
           </a:p>
           <a:p>
             <a:pPr lvl="1"/>
-            <a:endParaRPr lang="de-DE" dirty="0" smtClean="0"/>
-          </a:p>
-          <a:p>
-            <a:r>
-              <a:rPr lang="de-DE" dirty="0" smtClean="0"/>
+            <a:endParaRPr lang="de-DE" dirty="0"/>
+          </a:p>
+          <a:p>
+            <a:r>
+              <a:rPr lang="de-DE" dirty="0"/>
               <a:t>Sagt Bescheid, und wir lassen ihn gegen die anderen Antreten!</a:t>
             </a:r>
-            <a:endParaRPr lang="de-DE" dirty="0"/>
           </a:p>
         </p:txBody>
       </p:sp>
@@ -15099,13 +14987,6 @@
       <p:transition/>
     </mc:Fallback>
   </mc:AlternateContent>
-  <p:timing>
-    <p:tnLst>
-      <p:par>
-        <p:cTn id="1" dur="indefinite" restart="never" nodeType="tmRoot"/>
-      </p:par>
-    </p:tnLst>
-  </p:timing>
 </p:sld>
 </file>
 
@@ -15174,13 +15055,6 @@
       <p:transition/>
     </mc:Fallback>
   </mc:AlternateContent>
-  <p:timing>
-    <p:tnLst>
-      <p:par>
-        <p:cTn id="1" dur="indefinite" restart="never" nodeType="tmRoot"/>
-      </p:par>
-    </p:tnLst>
-  </p:timing>
 </p:sld>
 </file>
 
@@ -15292,13 +15166,6 @@
       <p:transition/>
     </mc:Fallback>
   </mc:AlternateContent>
-  <p:timing>
-    <p:tnLst>
-      <p:par>
-        <p:cTn id="1" dur="indefinite" restart="never" nodeType="tmRoot"/>
-      </p:par>
-    </p:tnLst>
-  </p:timing>
 </p:sld>
 </file>
 
@@ -15343,10 +15210,9 @@
           <a:lstStyle/>
           <a:p>
             <a:r>
-              <a:rPr lang="de-DE" dirty="0" smtClean="0"/>
+              <a:rPr lang="de-DE" dirty="0"/>
               <a:t>Vorbereitung</a:t>
             </a:r>
-            <a:endParaRPr lang="de-DE" dirty="0"/>
           </a:p>
         </p:txBody>
       </p:sp>
@@ -15371,53 +15237,53 @@
           <a:lstStyle/>
           <a:p>
             <a:r>
-              <a:rPr lang="de-DE" dirty="0" smtClean="0"/>
+              <a:rPr lang="de-DE" dirty="0"/>
               <a:t>Teilnehmer benötigen Kenntnisse mit:</a:t>
             </a:r>
           </a:p>
           <a:p>
             <a:pPr lvl="1"/>
             <a:r>
-              <a:rPr lang="de-DE" dirty="0" smtClean="0"/>
+              <a:rPr lang="de-DE" dirty="0"/>
               <a:t>Java</a:t>
             </a:r>
           </a:p>
           <a:p>
             <a:pPr lvl="1"/>
             <a:r>
-              <a:rPr lang="de-DE" dirty="0" smtClean="0"/>
+              <a:rPr lang="de-DE" dirty="0"/>
               <a:t>Hilfreich, aber nicht nötig: </a:t>
             </a:r>
             <a:r>
-              <a:rPr lang="de-DE" dirty="0" err="1" smtClean="0"/>
+              <a:rPr lang="de-DE" dirty="0" err="1"/>
               <a:t>Git</a:t>
             </a:r>
-            <a:endParaRPr lang="de-DE" dirty="0" smtClean="0"/>
+            <a:endParaRPr lang="de-DE" dirty="0"/>
           </a:p>
           <a:p>
             <a:pPr lvl="1"/>
-            <a:endParaRPr lang="de-DE" dirty="0" smtClean="0"/>
-          </a:p>
-          <a:p>
-            <a:r>
-              <a:rPr lang="de-DE" dirty="0" smtClean="0"/>
+            <a:endParaRPr lang="de-DE" dirty="0"/>
+          </a:p>
+          <a:p>
+            <a:r>
+              <a:rPr lang="de-DE" dirty="0"/>
               <a:t>Teilnehmer benötigen Laptop mit:</a:t>
             </a:r>
           </a:p>
           <a:p>
             <a:pPr lvl="1"/>
             <a:r>
-              <a:rPr lang="de-DE" dirty="0" smtClean="0"/>
+              <a:rPr lang="de-DE" dirty="0"/>
               <a:t>JDK</a:t>
             </a:r>
           </a:p>
           <a:p>
             <a:pPr lvl="1"/>
             <a:r>
-              <a:rPr lang="de-DE" dirty="0" err="1" smtClean="0"/>
+              <a:rPr lang="de-DE" dirty="0" err="1"/>
               <a:t>Git</a:t>
             </a:r>
-            <a:endParaRPr lang="de-DE" dirty="0" smtClean="0"/>
+            <a:endParaRPr lang="de-DE" dirty="0"/>
           </a:p>
           <a:p>
             <a:pPr lvl="2"/>
@@ -15425,54 +15291,48 @@
               <a:rPr lang="de-DE" dirty="0">
                 <a:hlinkClick r:id="rId2"/>
               </a:rPr>
-              <a:t>https://</a:t>
-            </a:r>
-            <a:r>
-              <a:rPr lang="de-DE" dirty="0" smtClean="0">
-                <a:hlinkClick r:id="rId2"/>
-              </a:rPr>
-              <a:t>github.com/Nijin22/actico-code-challenge-wolf</a:t>
-            </a:r>
-            <a:r>
-              <a:rPr lang="de-DE" dirty="0" smtClean="0"/>
+              <a:t>https://github.com/Nijin22/actico-code-challenge-wolf</a:t>
+            </a:r>
+            <a:r>
+              <a:rPr lang="de-DE" dirty="0"/>
               <a:t> klonen</a:t>
             </a:r>
           </a:p>
           <a:p>
             <a:pPr lvl="2"/>
             <a:r>
-              <a:rPr lang="de-DE" dirty="0" smtClean="0"/>
+              <a:rPr lang="de-DE" dirty="0"/>
               <a:t>Account einrichten, die auf das </a:t>
             </a:r>
             <a:r>
-              <a:rPr lang="de-DE" dirty="0" err="1" smtClean="0"/>
+              <a:rPr lang="de-DE" dirty="0" err="1"/>
               <a:t>Repo</a:t>
             </a:r>
             <a:r>
-              <a:rPr lang="de-DE" dirty="0" smtClean="0"/>
+              <a:rPr lang="de-DE" dirty="0"/>
               <a:t> pushen dürfen</a:t>
             </a:r>
           </a:p>
           <a:p>
             <a:pPr lvl="1"/>
             <a:r>
-              <a:rPr lang="de-DE" dirty="0" smtClean="0"/>
+              <a:rPr lang="de-DE" dirty="0"/>
               <a:t>Java-IDE (</a:t>
             </a:r>
             <a:r>
-              <a:rPr lang="de-DE" dirty="0" err="1" smtClean="0"/>
+              <a:rPr lang="de-DE" dirty="0" err="1"/>
               <a:t>Eclipse</a:t>
             </a:r>
             <a:r>
-              <a:rPr lang="de-DE" dirty="0" smtClean="0"/>
+              <a:rPr lang="de-DE" dirty="0"/>
               <a:t>, </a:t>
             </a:r>
             <a:r>
-              <a:rPr lang="de-DE" dirty="0" err="1" smtClean="0"/>
+              <a:rPr lang="de-DE" dirty="0" err="1"/>
               <a:t>IntelliJ</a:t>
             </a:r>
             <a:r>
-              <a:rPr lang="de-DE" dirty="0" smtClean="0"/>
+              <a:rPr lang="de-DE" dirty="0"/>
               <a:t>, …)</a:t>
             </a:r>
           </a:p>
@@ -15519,13 +15379,6 @@
       <p:transition/>
     </mc:Fallback>
   </mc:AlternateContent>
-  <p:timing>
-    <p:tnLst>
-      <p:par>
-        <p:cTn id="1" dur="indefinite" restart="never" nodeType="tmRoot"/>
-      </p:par>
-    </p:tnLst>
-  </p:timing>
 </p:sld>
 </file>
 
@@ -15629,13 +15482,6 @@
       <p:transition/>
     </mc:Fallback>
   </mc:AlternateContent>
-  <p:timing>
-    <p:tnLst>
-      <p:par>
-        <p:cTn id="1" dur="indefinite" restart="never" nodeType="tmRoot"/>
-      </p:par>
-    </p:tnLst>
-  </p:timing>
 </p:sld>
 </file>
 
@@ -15672,10 +15518,9 @@
           <a:lstStyle/>
           <a:p>
             <a:r>
-              <a:rPr lang="de-DE" dirty="0" smtClean="0"/>
+              <a:rPr lang="de-DE" dirty="0"/>
               <a:t>Überblick</a:t>
             </a:r>
-            <a:endParaRPr lang="de-DE" dirty="0"/>
           </a:p>
         </p:txBody>
       </p:sp>
@@ -15700,25 +15545,25 @@
           <a:lstStyle/>
           <a:p>
             <a:r>
-              <a:rPr lang="de-DE" dirty="0" smtClean="0"/>
+              <a:rPr lang="de-DE" dirty="0"/>
               <a:t>Jedes Team programmiert eine „Wolf-Rasse“, die versucht, in der Wildnis zu überleben.</a:t>
             </a:r>
           </a:p>
           <a:p>
-            <a:endParaRPr lang="de-DE" dirty="0" smtClean="0"/>
-          </a:p>
-          <a:p>
-            <a:r>
-              <a:rPr lang="de-DE" dirty="0" smtClean="0"/>
+            <a:endParaRPr lang="de-DE" dirty="0"/>
+          </a:p>
+          <a:p>
+            <a:r>
+              <a:rPr lang="de-DE" dirty="0"/>
               <a:t>Eine Simulation lässt eure Wölfe gegen Bären, Löwen, Steine und die Wölfe der anderen Teams antreten</a:t>
             </a:r>
           </a:p>
           <a:p>
-            <a:endParaRPr lang="de-DE" dirty="0" smtClean="0"/>
-          </a:p>
-          <a:p>
-            <a:r>
-              <a:rPr lang="de-DE" dirty="0" smtClean="0"/>
+            <a:endParaRPr lang="de-DE" dirty="0"/>
+          </a:p>
+          <a:p>
+            <a:r>
+              <a:rPr lang="de-DE" dirty="0"/>
               <a:t>Die Rasse, welche am Ende noch am meisten Überlebende hat, gewinnt!</a:t>
             </a:r>
           </a:p>
@@ -15791,7 +15636,7 @@
           <a:lstStyle/>
           <a:p>
             <a:r>
-              <a:rPr lang="de-DE" sz="1200" dirty="0" smtClean="0"/>
+              <a:rPr lang="de-DE" sz="1200" dirty="0"/>
               <a:t>Originelle Idee:</a:t>
             </a:r>
           </a:p>
@@ -15800,19 +15645,13 @@
               <a:rPr lang="de-DE" sz="1200" dirty="0">
                 <a:hlinkClick r:id="rId2"/>
               </a:rPr>
-              <a:t>https://</a:t>
-            </a:r>
-            <a:r>
-              <a:rPr lang="de-DE" sz="1200" dirty="0" smtClean="0">
-                <a:hlinkClick r:id="rId2"/>
-              </a:rPr>
-              <a:t>codegolf.stackexchange.com/questions/25347/survival-game-create-your-wolf</a:t>
-            </a:r>
-            <a:endParaRPr lang="de-DE" sz="1200" dirty="0" smtClean="0"/>
-          </a:p>
-          <a:p>
-            <a:r>
-              <a:rPr lang="de-DE" sz="1200" dirty="0" smtClean="0"/>
+              <a:t>https://codegolf.stackexchange.com/questions/25347/survival-game-create-your-wolf</a:t>
+            </a:r>
+            <a:endParaRPr lang="de-DE" sz="1200" dirty="0"/>
+          </a:p>
+          <a:p>
+            <a:r>
+              <a:rPr lang="de-DE" sz="1200" dirty="0"/>
               <a:t>Aber dort bitte keine Ideen klauen ;)</a:t>
             </a:r>
           </a:p>
@@ -15866,13 +15705,6 @@
       <p:transition/>
     </mc:Fallback>
   </mc:AlternateContent>
-  <p:timing>
-    <p:tnLst>
-      <p:par>
-        <p:cTn id="1" dur="indefinite" restart="never" nodeType="tmRoot"/>
-      </p:par>
-    </p:tnLst>
-  </p:timing>
 </p:sld>
 </file>
 
@@ -15909,10 +15741,9 @@
           <a:lstStyle/>
           <a:p>
             <a:r>
-              <a:rPr lang="de-DE" dirty="0" smtClean="0"/>
+              <a:rPr lang="de-DE" dirty="0"/>
               <a:t>Regeln</a:t>
             </a:r>
-            <a:endParaRPr lang="de-DE" dirty="0"/>
           </a:p>
         </p:txBody>
       </p:sp>
@@ -15937,28 +15768,28 @@
           <a:lstStyle/>
           <a:p>
             <a:r>
-              <a:rPr lang="de-DE" dirty="0" smtClean="0"/>
+              <a:rPr lang="de-DE" dirty="0"/>
               <a:t>Spielbrett</a:t>
             </a:r>
           </a:p>
           <a:p>
             <a:pPr lvl="1"/>
             <a:r>
-              <a:rPr lang="de-DE" dirty="0" smtClean="0"/>
+              <a:rPr lang="de-DE" dirty="0"/>
               <a:t>2-Dimensionale Karte</a:t>
             </a:r>
           </a:p>
           <a:p>
             <a:pPr lvl="1"/>
             <a:r>
-              <a:rPr lang="de-DE" dirty="0" smtClean="0"/>
+              <a:rPr lang="de-DE" dirty="0"/>
               <a:t>Überlaufende Ränder</a:t>
             </a:r>
           </a:p>
           <a:p>
             <a:pPr lvl="1"/>
             <a:r>
-              <a:rPr lang="de-DE" dirty="0" smtClean="0"/>
+              <a:rPr lang="de-DE" dirty="0"/>
               <a:t>Zu Beginn: 100 Instanzen pro Art und Team</a:t>
             </a:r>
           </a:p>
@@ -15966,11 +15797,7 @@
             <a:pPr lvl="1"/>
             <a:r>
               <a:rPr lang="de-DE" dirty="0"/>
-              <a:t>4</a:t>
-            </a:r>
-            <a:r>
-              <a:rPr lang="de-DE" dirty="0" smtClean="0"/>
-              <a:t> Arten von Teilnehmer: Löwe, Bär, Stein &amp; Wolf</a:t>
+              <a:t>4 Arten von Teilnehmer: Löwe, Bär, Stein &amp; Wolf</a:t>
             </a:r>
           </a:p>
           <a:p>
@@ -15979,28 +15806,28 @@
           </a:p>
           <a:p>
             <a:r>
-              <a:rPr lang="de-DE" dirty="0" smtClean="0"/>
+              <a:rPr lang="de-DE" dirty="0"/>
               <a:t>Bewegen</a:t>
             </a:r>
           </a:p>
           <a:p>
             <a:pPr lvl="1"/>
             <a:r>
-              <a:rPr lang="de-DE" dirty="0" smtClean="0"/>
+              <a:rPr lang="de-DE" dirty="0"/>
               <a:t>Alle Teilnehmer bewegen sich gleichzeitig</a:t>
             </a:r>
           </a:p>
           <a:p>
             <a:pPr lvl="1"/>
             <a:r>
-              <a:rPr lang="de-DE" dirty="0" smtClean="0"/>
+              <a:rPr lang="de-DE" dirty="0"/>
               <a:t>Möglichkeiten: Hoch / Runter / Links / Rechts / Stehen bleiben</a:t>
             </a:r>
           </a:p>
           <a:p>
             <a:pPr lvl="1"/>
             <a:r>
-              <a:rPr lang="de-DE" dirty="0" smtClean="0"/>
+              <a:rPr lang="de-DE" dirty="0"/>
               <a:t>Sind zum Ende 2 Teilnehmer auf dem gleiche Feld, starten Sie einen Kampf</a:t>
             </a:r>
           </a:p>
@@ -16010,38 +15837,37 @@
           </a:p>
           <a:p>
             <a:r>
-              <a:rPr lang="de-DE" dirty="0" smtClean="0"/>
+              <a:rPr lang="de-DE" dirty="0"/>
               <a:t>Kampf</a:t>
             </a:r>
           </a:p>
           <a:p>
             <a:pPr lvl="1"/>
             <a:r>
-              <a:rPr lang="de-DE" dirty="0" smtClean="0"/>
+              <a:rPr lang="de-DE" dirty="0"/>
               <a:t>Kämpfe werden durch Schere-Stein-Papier ausgetragen</a:t>
             </a:r>
           </a:p>
           <a:p>
             <a:pPr lvl="1"/>
             <a:r>
-              <a:rPr lang="de-DE" dirty="0" smtClean="0"/>
+              <a:rPr lang="de-DE" dirty="0"/>
               <a:t>Jeder Teilnehmer erhält die Art des Gegners als Parameter (Wolf, Stein, Löwe, Bär)</a:t>
             </a:r>
           </a:p>
           <a:p>
             <a:pPr lvl="1"/>
             <a:r>
-              <a:rPr lang="de-DE" dirty="0" smtClean="0"/>
+              <a:rPr lang="de-DE" dirty="0"/>
               <a:t>Bei gleichem Wurf, entscheidet der Zufall</a:t>
             </a:r>
           </a:p>
           <a:p>
             <a:pPr lvl="1"/>
             <a:r>
-              <a:rPr lang="de-DE" dirty="0" smtClean="0"/>
+              <a:rPr lang="de-DE" dirty="0"/>
               <a:t>Der Verlierer wird aus dem Spiel entfernt</a:t>
             </a:r>
-            <a:endParaRPr lang="de-DE" dirty="0"/>
           </a:p>
         </p:txBody>
       </p:sp>
@@ -16082,13 +15908,6 @@
       <p:transition/>
     </mc:Fallback>
   </mc:AlternateContent>
-  <p:timing>
-    <p:tnLst>
-      <p:par>
-        <p:cTn id="1" dur="indefinite" restart="never" nodeType="tmRoot"/>
-      </p:par>
-    </p:tnLst>
-  </p:timing>
 </p:sld>
 </file>
 
@@ -16125,10 +15944,9 @@
           <a:lstStyle/>
           <a:p>
             <a:r>
-              <a:rPr lang="de-DE" dirty="0" smtClean="0"/>
+              <a:rPr lang="de-DE" dirty="0"/>
               <a:t>Arten von Tieren</a:t>
             </a:r>
-            <a:endParaRPr lang="de-DE" dirty="0"/>
           </a:p>
         </p:txBody>
       </p:sp>
@@ -16153,99 +15971,99 @@
           <a:lstStyle/>
           <a:p>
             <a:r>
-              <a:rPr lang="de-DE" dirty="0" smtClean="0"/>
+              <a:rPr lang="de-DE" dirty="0"/>
               <a:t>Löwe:</a:t>
             </a:r>
           </a:p>
           <a:p>
             <a:pPr lvl="1"/>
             <a:r>
-              <a:rPr lang="de-DE" dirty="0" smtClean="0"/>
+              <a:rPr lang="de-DE" dirty="0"/>
               <a:t>Erscheint als ‚L‘ auf der Karte</a:t>
             </a:r>
           </a:p>
           <a:p>
             <a:pPr lvl="1"/>
             <a:r>
-              <a:rPr lang="de-DE" dirty="0" smtClean="0"/>
+              <a:rPr lang="de-DE" dirty="0"/>
               <a:t>Bewegt sich erst nach unten, dann nach rechts, dann wieder nach unten…</a:t>
             </a:r>
           </a:p>
           <a:p>
             <a:pPr lvl="1"/>
             <a:r>
-              <a:rPr lang="de-DE" dirty="0" smtClean="0"/>
+              <a:rPr lang="de-DE" dirty="0"/>
               <a:t>Greift entweder mit Papier oder mit Schere an</a:t>
             </a:r>
           </a:p>
           <a:p>
             <a:r>
-              <a:rPr lang="de-DE" dirty="0" smtClean="0"/>
+              <a:rPr lang="de-DE" dirty="0"/>
               <a:t>Bär</a:t>
             </a:r>
           </a:p>
           <a:p>
             <a:pPr lvl="1"/>
             <a:r>
-              <a:rPr lang="de-DE" dirty="0" smtClean="0"/>
+              <a:rPr lang="de-DE" dirty="0"/>
               <a:t>Erscheint als ‚B‘ auf der Karte</a:t>
             </a:r>
           </a:p>
           <a:p>
             <a:pPr lvl="1"/>
             <a:r>
-              <a:rPr lang="de-DE" dirty="0" smtClean="0"/>
+              <a:rPr lang="de-DE" dirty="0"/>
               <a:t>Bewegt sich je 4x nach unten, rechts, oben, links und wiederholt dann</a:t>
             </a:r>
           </a:p>
           <a:p>
             <a:pPr lvl="1"/>
             <a:r>
-              <a:rPr lang="de-DE" dirty="0" smtClean="0"/>
+              <a:rPr lang="de-DE" dirty="0"/>
               <a:t>Greift mit Papier an</a:t>
             </a:r>
           </a:p>
           <a:p>
             <a:r>
-              <a:rPr lang="de-DE" dirty="0" smtClean="0"/>
+              <a:rPr lang="de-DE" dirty="0"/>
               <a:t>Stein</a:t>
             </a:r>
           </a:p>
           <a:p>
             <a:pPr lvl="1"/>
             <a:r>
-              <a:rPr lang="de-DE" dirty="0" smtClean="0"/>
+              <a:rPr lang="de-DE" dirty="0"/>
               <a:t>Erscheint als ‚S‘ auf der Karte</a:t>
             </a:r>
           </a:p>
           <a:p>
             <a:pPr lvl="1"/>
             <a:r>
-              <a:rPr lang="de-DE" dirty="0" smtClean="0"/>
+              <a:rPr lang="de-DE" dirty="0"/>
               <a:t>Bewegt sich nicht</a:t>
             </a:r>
           </a:p>
           <a:p>
             <a:pPr lvl="1"/>
             <a:r>
-              <a:rPr lang="de-DE" dirty="0" smtClean="0"/>
+              <a:rPr lang="de-DE" dirty="0"/>
               <a:t>Greift mit Stein an</a:t>
             </a:r>
           </a:p>
           <a:p>
             <a:r>
-              <a:rPr lang="de-DE" dirty="0" smtClean="0"/>
+              <a:rPr lang="de-DE" dirty="0"/>
               <a:t>Wolf</a:t>
             </a:r>
           </a:p>
           <a:p>
             <a:pPr lvl="1"/>
             <a:r>
-              <a:rPr lang="de-DE" dirty="0" smtClean="0"/>
+              <a:rPr lang="de-DE" dirty="0"/>
               <a:t>Wird von euch programmiert! </a:t>
             </a:r>
             <a:r>
-              <a:rPr lang="de-DE" dirty="0" smtClean="0">
+              <a:rPr lang="de-DE" dirty="0">
                 <a:sym typeface="Wingdings" panose="05000000000000000000" pitchFamily="2" charset="2"/>
               </a:rPr>
               <a:t></a:t>
@@ -16291,13 +16109,6 @@
       <p:transition/>
     </mc:Fallback>
   </mc:AlternateContent>
-  <p:timing>
-    <p:tnLst>
-      <p:par>
-        <p:cTn id="1" dur="indefinite" restart="never" nodeType="tmRoot"/>
-      </p:par>
-    </p:tnLst>
-  </p:timing>
 </p:sld>
 </file>
 
@@ -16401,13 +16212,6 @@
       <p:transition/>
     </mc:Fallback>
   </mc:AlternateContent>
-  <p:timing>
-    <p:tnLst>
-      <p:par>
-        <p:cTn id="1" dur="indefinite" restart="never" nodeType="tmRoot"/>
-      </p:par>
-    </p:tnLst>
-  </p:timing>
 </p:sld>
 </file>
 

</xml_diff>